<commit_message>
Fixed some issues in the poster submitted
</commit_message>
<xml_diff>
--- a/Poster/Poster_Presentation.pptx
+++ b/Poster/Poster_Presentation.pptx
@@ -13579,7 +13579,7 @@
                         <a:buNone/>
                       </a:pPr>
                       <a:r>
-                        <a:rPr lang="en-US" sz="1300" b="0" u="none" strike="noStrike">
+                        <a:rPr lang="en-US" sz="1300" b="0" u="none" strike="noStrike" dirty="0">
                           <a:solidFill>
                             <a:srgbClr val="000000"/>
                           </a:solidFill>
@@ -14445,1059 +14445,6 @@
           </p:sp>
         </mc:Fallback>
       </mc:AlternateContent>
-      <p:graphicFrame>
-        <p:nvGraphicFramePr>
-          <p:cNvPr id="21" name="Table 20">
-            <a:extLst>
-              <a:ext uri="{FF2B5EF4-FFF2-40B4-BE49-F238E27FC236}">
-                <a16:creationId xmlns:a16="http://schemas.microsoft.com/office/drawing/2014/main" id="{03CDFD4B-C76F-D8C4-F1F4-A581FAE5CD5A}"/>
-              </a:ext>
-            </a:extLst>
-          </p:cNvPr>
-          <p:cNvGraphicFramePr>
-            <a:graphicFrameLocks noGrp="1"/>
-          </p:cNvGraphicFramePr>
-          <p:nvPr>
-            <p:extLst>
-              <p:ext uri="{D42A27DB-BD31-4B8C-83A1-F6EECF244321}">
-                <p14:modId xmlns:p14="http://schemas.microsoft.com/office/powerpoint/2010/main" val="2623703248"/>
-              </p:ext>
-            </p:extLst>
-          </p:nvPr>
-        </p:nvGraphicFramePr>
-        <p:xfrm>
-          <a:off x="16068210" y="11692574"/>
-          <a:ext cx="5480400" cy="1958598"/>
-        </p:xfrm>
-        <a:graphic>
-          <a:graphicData uri="http://schemas.openxmlformats.org/drawingml/2006/table">
-            <a:tbl>
-              <a:tblPr>
-                <a:tableStyleId>{305F176E-F5B0-49BC-A6F0-7B532ED82268}</a:tableStyleId>
-              </a:tblPr>
-              <a:tblGrid>
-                <a:gridCol w="733751">
-                  <a:extLst>
-                    <a:ext uri="{9D8B030D-6E8A-4147-A177-3AD203B41FA5}">
-                      <a16:colId xmlns:a16="http://schemas.microsoft.com/office/drawing/2014/main" val="3099122297"/>
-                    </a:ext>
-                  </a:extLst>
-                </a:gridCol>
-                <a:gridCol w="785591">
-                  <a:extLst>
-                    <a:ext uri="{9D8B030D-6E8A-4147-A177-3AD203B41FA5}">
-                      <a16:colId xmlns:a16="http://schemas.microsoft.com/office/drawing/2014/main" val="419928829"/>
-                    </a:ext>
-                  </a:extLst>
-                </a:gridCol>
-                <a:gridCol w="876528">
-                  <a:extLst>
-                    <a:ext uri="{9D8B030D-6E8A-4147-A177-3AD203B41FA5}">
-                      <a16:colId xmlns:a16="http://schemas.microsoft.com/office/drawing/2014/main" val="677725414"/>
-                    </a:ext>
-                  </a:extLst>
-                </a:gridCol>
-                <a:gridCol w="3084530">
-                  <a:extLst>
-                    <a:ext uri="{9D8B030D-6E8A-4147-A177-3AD203B41FA5}">
-                      <a16:colId xmlns:a16="http://schemas.microsoft.com/office/drawing/2014/main" val="1933723019"/>
-                    </a:ext>
-                  </a:extLst>
-                </a:gridCol>
-              </a:tblGrid>
-              <a:tr h="324384">
-                <a:tc>
-                  <a:txBody>
-                    <a:bodyPr/>
-                    <a:lstStyle/>
-                    <a:p>
-                      <a:pPr lvl="1" algn="ctr" rtl="0" fontAlgn="t">
-                        <a:buNone/>
-                      </a:pPr>
-                      <a:r>
-                        <a:rPr lang="en-US" sz="1300" b="0" u="none" strike="noStrike">
-                          <a:solidFill>
-                            <a:srgbClr val="000000"/>
-                          </a:solidFill>
-                          <a:effectLst/>
-                        </a:rPr>
-                        <a:t>Mean</a:t>
-                      </a:r>
-                      <a:endParaRPr lang="en-US" sz="1300" b="0" dirty="0">
-                        <a:effectLst/>
-                      </a:endParaRPr>
-                    </a:p>
-                  </a:txBody>
-                  <a:tcPr marL="16500" marR="16500" marT="57749" marB="16500" anchor="ctr">
-                    <a:lnL w="12700" cap="flat" cmpd="sng" algn="ctr">
-                      <a:solidFill>
-                        <a:schemeClr val="tx1"/>
-                      </a:solidFill>
-                      <a:prstDash val="solid"/>
-                      <a:round/>
-                      <a:headEnd type="none" w="med" len="med"/>
-                      <a:tailEnd type="none" w="med" len="med"/>
-                    </a:lnL>
-                    <a:lnR w="12700" cap="flat" cmpd="sng" algn="ctr">
-                      <a:solidFill>
-                        <a:schemeClr val="tx1"/>
-                      </a:solidFill>
-                      <a:prstDash val="solid"/>
-                      <a:round/>
-                      <a:headEnd type="none" w="med" len="med"/>
-                      <a:tailEnd type="none" w="med" len="med"/>
-                    </a:lnR>
-                    <a:lnT w="12700" cap="flat" cmpd="sng" algn="ctr">
-                      <a:solidFill>
-                        <a:schemeClr val="tx1"/>
-                      </a:solidFill>
-                      <a:prstDash val="solid"/>
-                      <a:round/>
-                      <a:headEnd type="none" w="med" len="med"/>
-                      <a:tailEnd type="none" w="med" len="med"/>
-                    </a:lnT>
-                    <a:lnB w="12700" cap="flat" cmpd="sng" algn="ctr">
-                      <a:solidFill>
-                        <a:schemeClr val="tx1"/>
-                      </a:solidFill>
-                      <a:prstDash val="solid"/>
-                      <a:round/>
-                      <a:headEnd type="none" w="med" len="med"/>
-                      <a:tailEnd type="none" w="med" len="med"/>
-                    </a:lnB>
-                  </a:tcPr>
-                </a:tc>
-                <a:tc>
-                  <a:txBody>
-                    <a:bodyPr/>
-                    <a:lstStyle/>
-                    <a:p>
-                      <a:pPr lvl="1" algn="ctr" rtl="0" fontAlgn="t">
-                        <a:buNone/>
-                      </a:pPr>
-                      <a:r>
-                        <a:rPr lang="en-US" sz="1300" b="0" u="none" strike="noStrike">
-                          <a:solidFill>
-                            <a:srgbClr val="000000"/>
-                          </a:solidFill>
-                          <a:effectLst/>
-                        </a:rPr>
-                        <a:t>2.5%</a:t>
-                      </a:r>
-                      <a:endParaRPr lang="en-US" sz="1300" b="0" dirty="0">
-                        <a:effectLst/>
-                      </a:endParaRPr>
-                    </a:p>
-                  </a:txBody>
-                  <a:tcPr marL="16500" marR="16500" marT="57749" marB="16500" anchor="ctr">
-                    <a:lnL w="12700" cap="flat" cmpd="sng" algn="ctr">
-                      <a:solidFill>
-                        <a:schemeClr val="tx1"/>
-                      </a:solidFill>
-                      <a:prstDash val="solid"/>
-                      <a:round/>
-                      <a:headEnd type="none" w="med" len="med"/>
-                      <a:tailEnd type="none" w="med" len="med"/>
-                    </a:lnL>
-                    <a:lnR w="12700" cap="flat" cmpd="sng" algn="ctr">
-                      <a:solidFill>
-                        <a:schemeClr val="tx1"/>
-                      </a:solidFill>
-                      <a:prstDash val="solid"/>
-                      <a:round/>
-                      <a:headEnd type="none" w="med" len="med"/>
-                      <a:tailEnd type="none" w="med" len="med"/>
-                    </a:lnR>
-                    <a:lnT w="12700" cap="flat" cmpd="sng" algn="ctr">
-                      <a:solidFill>
-                        <a:schemeClr val="tx1"/>
-                      </a:solidFill>
-                      <a:prstDash val="solid"/>
-                      <a:round/>
-                      <a:headEnd type="none" w="med" len="med"/>
-                      <a:tailEnd type="none" w="med" len="med"/>
-                    </a:lnT>
-                    <a:lnB w="12700" cap="flat" cmpd="sng" algn="ctr">
-                      <a:solidFill>
-                        <a:schemeClr val="tx1"/>
-                      </a:solidFill>
-                      <a:prstDash val="solid"/>
-                      <a:round/>
-                      <a:headEnd type="none" w="med" len="med"/>
-                      <a:tailEnd type="none" w="med" len="med"/>
-                    </a:lnB>
-                  </a:tcPr>
-                </a:tc>
-                <a:tc>
-                  <a:txBody>
-                    <a:bodyPr/>
-                    <a:lstStyle/>
-                    <a:p>
-                      <a:pPr lvl="1" algn="ctr" rtl="0" fontAlgn="t">
-                        <a:buNone/>
-                      </a:pPr>
-                      <a:r>
-                        <a:rPr lang="en-US" sz="1300" b="0" u="none" strike="noStrike">
-                          <a:solidFill>
-                            <a:srgbClr val="000000"/>
-                          </a:solidFill>
-                          <a:effectLst/>
-                        </a:rPr>
-                        <a:t>97.5%</a:t>
-                      </a:r>
-                      <a:endParaRPr lang="en-US" sz="1300" b="0" dirty="0">
-                        <a:effectLst/>
-                      </a:endParaRPr>
-                    </a:p>
-                  </a:txBody>
-                  <a:tcPr marL="16500" marR="16500" marT="57749" marB="16500" anchor="ctr">
-                    <a:lnL w="12700" cap="flat" cmpd="sng" algn="ctr">
-                      <a:solidFill>
-                        <a:schemeClr val="tx1"/>
-                      </a:solidFill>
-                      <a:prstDash val="solid"/>
-                      <a:round/>
-                      <a:headEnd type="none" w="med" len="med"/>
-                      <a:tailEnd type="none" w="med" len="med"/>
-                    </a:lnL>
-                    <a:lnR w="12700" cap="flat" cmpd="sng" algn="ctr">
-                      <a:solidFill>
-                        <a:schemeClr val="tx1"/>
-                      </a:solidFill>
-                      <a:prstDash val="solid"/>
-                      <a:round/>
-                      <a:headEnd type="none" w="med" len="med"/>
-                      <a:tailEnd type="none" w="med" len="med"/>
-                    </a:lnR>
-                    <a:lnT w="12700" cap="flat" cmpd="sng" algn="ctr">
-                      <a:solidFill>
-                        <a:schemeClr val="tx1"/>
-                      </a:solidFill>
-                      <a:prstDash val="solid"/>
-                      <a:round/>
-                      <a:headEnd type="none" w="med" len="med"/>
-                      <a:tailEnd type="none" w="med" len="med"/>
-                    </a:lnT>
-                    <a:lnB w="12700" cap="flat" cmpd="sng" algn="ctr">
-                      <a:solidFill>
-                        <a:schemeClr val="tx1"/>
-                      </a:solidFill>
-                      <a:prstDash val="solid"/>
-                      <a:round/>
-                      <a:headEnd type="none" w="med" len="med"/>
-                      <a:tailEnd type="none" w="med" len="med"/>
-                    </a:lnB>
-                  </a:tcPr>
-                </a:tc>
-                <a:tc>
-                  <a:txBody>
-                    <a:bodyPr/>
-                    <a:lstStyle/>
-                    <a:p>
-                      <a:pPr lvl="1" algn="ctr" rtl="0" fontAlgn="t">
-                        <a:buNone/>
-                      </a:pPr>
-                      <a:r>
-                        <a:rPr lang="en-US" sz="1300" b="0" u="none" strike="noStrike">
-                          <a:solidFill>
-                            <a:srgbClr val="000000"/>
-                          </a:solidFill>
-                          <a:effectLst/>
-                        </a:rPr>
-                        <a:t>Region</a:t>
-                      </a:r>
-                      <a:endParaRPr lang="en-US" sz="1300" b="0" dirty="0">
-                        <a:effectLst/>
-                      </a:endParaRPr>
-                    </a:p>
-                  </a:txBody>
-                  <a:tcPr marL="16500" marR="16500" marT="57749" marB="16500" anchor="ctr">
-                    <a:lnL w="12700" cap="flat" cmpd="sng" algn="ctr">
-                      <a:solidFill>
-                        <a:schemeClr val="tx1"/>
-                      </a:solidFill>
-                      <a:prstDash val="solid"/>
-                      <a:round/>
-                      <a:headEnd type="none" w="med" len="med"/>
-                      <a:tailEnd type="none" w="med" len="med"/>
-                    </a:lnL>
-                    <a:lnR w="12700" cap="flat" cmpd="sng" algn="ctr">
-                      <a:solidFill>
-                        <a:schemeClr val="tx1"/>
-                      </a:solidFill>
-                      <a:prstDash val="solid"/>
-                      <a:round/>
-                      <a:headEnd type="none" w="med" len="med"/>
-                      <a:tailEnd type="none" w="med" len="med"/>
-                    </a:lnR>
-                    <a:lnT w="12700" cap="flat" cmpd="sng" algn="ctr">
-                      <a:solidFill>
-                        <a:schemeClr val="tx1"/>
-                      </a:solidFill>
-                      <a:prstDash val="solid"/>
-                      <a:round/>
-                      <a:headEnd type="none" w="med" len="med"/>
-                      <a:tailEnd type="none" w="med" len="med"/>
-                    </a:lnT>
-                    <a:lnB w="12700" cap="flat" cmpd="sng" algn="ctr">
-                      <a:solidFill>
-                        <a:schemeClr val="tx1"/>
-                      </a:solidFill>
-                      <a:prstDash val="solid"/>
-                      <a:round/>
-                      <a:headEnd type="none" w="med" len="med"/>
-                      <a:tailEnd type="none" w="med" len="med"/>
-                    </a:lnB>
-                  </a:tcPr>
-                </a:tc>
-                <a:extLst>
-                  <a:ext uri="{0D108BD9-81ED-4DB2-BD59-A6C34878D82A}">
-                    <a16:rowId xmlns:a16="http://schemas.microsoft.com/office/drawing/2014/main" val="2923528179"/>
-                  </a:ext>
-                </a:extLst>
-              </a:tr>
-              <a:tr h="272245">
-                <a:tc>
-                  <a:txBody>
-                    <a:bodyPr/>
-                    <a:lstStyle/>
-                    <a:p>
-                      <a:pPr lvl="1" algn="ctr" rtl="0" fontAlgn="t">
-                        <a:buNone/>
-                      </a:pPr>
-                      <a:r>
-                        <a:rPr lang="en-US" sz="1300" b="0" u="none" strike="noStrike">
-                          <a:solidFill>
-                            <a:srgbClr val="000000"/>
-                          </a:solidFill>
-                          <a:effectLst/>
-                        </a:rPr>
-                        <a:t>7.96</a:t>
-                      </a:r>
-                      <a:endParaRPr lang="en-US" sz="1300">
-                        <a:effectLst/>
-                      </a:endParaRPr>
-                    </a:p>
-                  </a:txBody>
-                  <a:tcPr marL="16500" marR="16500" marT="57749" marB="16500">
-                    <a:lnT w="12700" cap="flat" cmpd="sng" algn="ctr">
-                      <a:solidFill>
-                        <a:schemeClr val="tx1"/>
-                      </a:solidFill>
-                      <a:prstDash val="solid"/>
-                      <a:round/>
-                      <a:headEnd type="none" w="med" len="med"/>
-                      <a:tailEnd type="none" w="med" len="med"/>
-                    </a:lnT>
-                  </a:tcPr>
-                </a:tc>
-                <a:tc>
-                  <a:txBody>
-                    <a:bodyPr/>
-                    <a:lstStyle/>
-                    <a:p>
-                      <a:pPr lvl="1" algn="ctr" rtl="0" fontAlgn="t">
-                        <a:buNone/>
-                      </a:pPr>
-                      <a:r>
-                        <a:rPr lang="en-US" sz="1300" b="0" u="none" strike="noStrike">
-                          <a:solidFill>
-                            <a:srgbClr val="000000"/>
-                          </a:solidFill>
-                          <a:effectLst/>
-                        </a:rPr>
-                        <a:t>7.37</a:t>
-                      </a:r>
-                      <a:endParaRPr lang="en-US" sz="1300">
-                        <a:effectLst/>
-                      </a:endParaRPr>
-                    </a:p>
-                  </a:txBody>
-                  <a:tcPr marL="16500" marR="16500" marT="57749" marB="16500">
-                    <a:lnT w="12700" cap="flat" cmpd="sng" algn="ctr">
-                      <a:solidFill>
-                        <a:schemeClr val="tx1"/>
-                      </a:solidFill>
-                      <a:prstDash val="solid"/>
-                      <a:round/>
-                      <a:headEnd type="none" w="med" len="med"/>
-                      <a:tailEnd type="none" w="med" len="med"/>
-                    </a:lnT>
-                  </a:tcPr>
-                </a:tc>
-                <a:tc>
-                  <a:txBody>
-                    <a:bodyPr/>
-                    <a:lstStyle/>
-                    <a:p>
-                      <a:pPr lvl="1" algn="ctr" rtl="0" fontAlgn="t">
-                        <a:buNone/>
-                      </a:pPr>
-                      <a:r>
-                        <a:rPr lang="en-US" sz="1300" b="0" u="none" strike="noStrike">
-                          <a:solidFill>
-                            <a:srgbClr val="000000"/>
-                          </a:solidFill>
-                          <a:effectLst/>
-                        </a:rPr>
-                        <a:t>8.55</a:t>
-                      </a:r>
-                      <a:endParaRPr lang="en-US" sz="1300" dirty="0">
-                        <a:effectLst/>
-                      </a:endParaRPr>
-                    </a:p>
-                  </a:txBody>
-                  <a:tcPr marL="16500" marR="16500" marT="57749" marB="16500">
-                    <a:lnT w="12700" cap="flat" cmpd="sng" algn="ctr">
-                      <a:solidFill>
-                        <a:schemeClr val="tx1"/>
-                      </a:solidFill>
-                      <a:prstDash val="solid"/>
-                      <a:round/>
-                      <a:headEnd type="none" w="med" len="med"/>
-                      <a:tailEnd type="none" w="med" len="med"/>
-                    </a:lnT>
-                  </a:tcPr>
-                </a:tc>
-                <a:tc>
-                  <a:txBody>
-                    <a:bodyPr/>
-                    <a:lstStyle/>
-                    <a:p>
-                      <a:pPr lvl="1" algn="ctr" rtl="0" fontAlgn="t">
-                        <a:buNone/>
-                      </a:pPr>
-                      <a:r>
-                        <a:rPr lang="en-US" sz="1300" b="0" u="none" strike="noStrike">
-                          <a:solidFill>
-                            <a:srgbClr val="000000"/>
-                          </a:solidFill>
-                          <a:effectLst/>
-                        </a:rPr>
-                        <a:t>HSE Mid West</a:t>
-                      </a:r>
-                      <a:endParaRPr lang="en-US" sz="1300" dirty="0">
-                        <a:effectLst/>
-                      </a:endParaRPr>
-                    </a:p>
-                  </a:txBody>
-                  <a:tcPr marL="16500" marR="16500" marT="57749" marB="16500">
-                    <a:lnT w="12700" cap="flat" cmpd="sng" algn="ctr">
-                      <a:solidFill>
-                        <a:schemeClr val="tx1"/>
-                      </a:solidFill>
-                      <a:prstDash val="solid"/>
-                      <a:round/>
-                      <a:headEnd type="none" w="med" len="med"/>
-                      <a:tailEnd type="none" w="med" len="med"/>
-                    </a:lnT>
-                  </a:tcPr>
-                </a:tc>
-                <a:extLst>
-                  <a:ext uri="{0D108BD9-81ED-4DB2-BD59-A6C34878D82A}">
-                    <a16:rowId xmlns:a16="http://schemas.microsoft.com/office/drawing/2014/main" val="196541862"/>
-                  </a:ext>
-                </a:extLst>
-              </a:tr>
-              <a:tr h="272245">
-                <a:tc>
-                  <a:txBody>
-                    <a:bodyPr/>
-                    <a:lstStyle/>
-                    <a:p>
-                      <a:pPr lvl="1" algn="ctr" rtl="0" fontAlgn="t">
-                        <a:buNone/>
-                      </a:pPr>
-                      <a:r>
-                        <a:rPr lang="en-US" sz="1300" b="0" u="none" strike="noStrike">
-                          <a:solidFill>
-                            <a:srgbClr val="000000"/>
-                          </a:solidFill>
-                          <a:effectLst/>
-                        </a:rPr>
-                        <a:t>6.18</a:t>
-                      </a:r>
-                      <a:endParaRPr lang="en-US" sz="1300">
-                        <a:effectLst/>
-                      </a:endParaRPr>
-                    </a:p>
-                  </a:txBody>
-                  <a:tcPr marL="16500" marR="16500" marT="57749" marB="16500"/>
-                </a:tc>
-                <a:tc>
-                  <a:txBody>
-                    <a:bodyPr/>
-                    <a:lstStyle/>
-                    <a:p>
-                      <a:pPr lvl="1" algn="ctr" rtl="0" fontAlgn="t">
-                        <a:buNone/>
-                      </a:pPr>
-                      <a:r>
-                        <a:rPr lang="en-US" sz="1300" b="0" u="none" strike="noStrike">
-                          <a:solidFill>
-                            <a:srgbClr val="000000"/>
-                          </a:solidFill>
-                          <a:effectLst/>
-                        </a:rPr>
-                        <a:t>5.67</a:t>
-                      </a:r>
-                      <a:endParaRPr lang="en-US" sz="1300">
-                        <a:effectLst/>
-                      </a:endParaRPr>
-                    </a:p>
-                  </a:txBody>
-                  <a:tcPr marL="16500" marR="16500" marT="57749" marB="16500"/>
-                </a:tc>
-                <a:tc>
-                  <a:txBody>
-                    <a:bodyPr/>
-                    <a:lstStyle/>
-                    <a:p>
-                      <a:pPr lvl="1" algn="ctr" rtl="0" fontAlgn="t">
-                        <a:buNone/>
-                      </a:pPr>
-                      <a:r>
-                        <a:rPr lang="en-US" sz="1300" b="0" u="none" strike="noStrike">
-                          <a:solidFill>
-                            <a:srgbClr val="000000"/>
-                          </a:solidFill>
-                          <a:effectLst/>
-                        </a:rPr>
-                        <a:t>6.7</a:t>
-                      </a:r>
-                      <a:endParaRPr lang="en-US" sz="1300">
-                        <a:effectLst/>
-                      </a:endParaRPr>
-                    </a:p>
-                  </a:txBody>
-                  <a:tcPr marL="16500" marR="16500" marT="57749" marB="16500"/>
-                </a:tc>
-                <a:tc>
-                  <a:txBody>
-                    <a:bodyPr/>
-                    <a:lstStyle/>
-                    <a:p>
-                      <a:pPr lvl="1" algn="ctr" rtl="0" fontAlgn="t">
-                        <a:buNone/>
-                      </a:pPr>
-                      <a:r>
-                        <a:rPr lang="en-US" sz="1300" b="0" u="none" strike="noStrike">
-                          <a:solidFill>
-                            <a:srgbClr val="000000"/>
-                          </a:solidFill>
-                          <a:effectLst/>
-                        </a:rPr>
-                        <a:t>HSE West and North West</a:t>
-                      </a:r>
-                      <a:endParaRPr lang="en-US" sz="1300" dirty="0">
-                        <a:effectLst/>
-                      </a:endParaRPr>
-                    </a:p>
-                  </a:txBody>
-                  <a:tcPr marL="16500" marR="16500" marT="57749" marB="16500"/>
-                </a:tc>
-                <a:extLst>
-                  <a:ext uri="{0D108BD9-81ED-4DB2-BD59-A6C34878D82A}">
-                    <a16:rowId xmlns:a16="http://schemas.microsoft.com/office/drawing/2014/main" val="973404960"/>
-                  </a:ext>
-                </a:extLst>
-              </a:tr>
-              <a:tr h="272245">
-                <a:tc>
-                  <a:txBody>
-                    <a:bodyPr/>
-                    <a:lstStyle/>
-                    <a:p>
-                      <a:pPr lvl="1" algn="ctr" rtl="0" fontAlgn="t">
-                        <a:buNone/>
-                      </a:pPr>
-                      <a:r>
-                        <a:rPr lang="en-US" sz="1300" b="0" u="none" strike="noStrike">
-                          <a:solidFill>
-                            <a:srgbClr val="000000"/>
-                          </a:solidFill>
-                          <a:effectLst/>
-                        </a:rPr>
-                        <a:t>4.27</a:t>
-                      </a:r>
-                      <a:endParaRPr lang="en-US" sz="1300" dirty="0">
-                        <a:effectLst/>
-                      </a:endParaRPr>
-                    </a:p>
-                  </a:txBody>
-                  <a:tcPr marL="16500" marR="16500" marT="57749" marB="16500">
-                    <a:lnB w="12700" cap="flat" cmpd="sng" algn="ctr">
-                      <a:solidFill>
-                        <a:schemeClr val="tx1"/>
-                      </a:solidFill>
-                      <a:prstDash val="solid"/>
-                      <a:round/>
-                      <a:headEnd type="none" w="med" len="med"/>
-                      <a:tailEnd type="none" w="med" len="med"/>
-                    </a:lnB>
-                  </a:tcPr>
-                </a:tc>
-                <a:tc>
-                  <a:txBody>
-                    <a:bodyPr/>
-                    <a:lstStyle/>
-                    <a:p>
-                      <a:pPr lvl="1" algn="ctr" rtl="0" fontAlgn="t">
-                        <a:buNone/>
-                      </a:pPr>
-                      <a:r>
-                        <a:rPr lang="en-US" sz="1300" b="0" u="none" strike="noStrike">
-                          <a:solidFill>
-                            <a:srgbClr val="000000"/>
-                          </a:solidFill>
-                          <a:effectLst/>
-                        </a:rPr>
-                        <a:t>3.82</a:t>
-                      </a:r>
-                      <a:endParaRPr lang="en-US" sz="1300">
-                        <a:effectLst/>
-                      </a:endParaRPr>
-                    </a:p>
-                  </a:txBody>
-                  <a:tcPr marL="16500" marR="16500" marT="57749" marB="16500">
-                    <a:lnB w="12700" cap="flat" cmpd="sng" algn="ctr">
-                      <a:solidFill>
-                        <a:schemeClr val="tx1"/>
-                      </a:solidFill>
-                      <a:prstDash val="solid"/>
-                      <a:round/>
-                      <a:headEnd type="none" w="med" len="med"/>
-                      <a:tailEnd type="none" w="med" len="med"/>
-                    </a:lnB>
-                  </a:tcPr>
-                </a:tc>
-                <a:tc>
-                  <a:txBody>
-                    <a:bodyPr/>
-                    <a:lstStyle/>
-                    <a:p>
-                      <a:pPr lvl="1" algn="ctr" rtl="0" fontAlgn="t">
-                        <a:buNone/>
-                      </a:pPr>
-                      <a:r>
-                        <a:rPr lang="en-US" sz="1300" b="0" u="none" strike="noStrike">
-                          <a:solidFill>
-                            <a:srgbClr val="000000"/>
-                          </a:solidFill>
-                          <a:effectLst/>
-                        </a:rPr>
-                        <a:t>4.7</a:t>
-                      </a:r>
-                      <a:endParaRPr lang="en-US" sz="1300">
-                        <a:effectLst/>
-                      </a:endParaRPr>
-                    </a:p>
-                  </a:txBody>
-                  <a:tcPr marL="16500" marR="16500" marT="57749" marB="16500">
-                    <a:lnB w="12700" cap="flat" cmpd="sng" algn="ctr">
-                      <a:solidFill>
-                        <a:schemeClr val="tx1"/>
-                      </a:solidFill>
-                      <a:prstDash val="solid"/>
-                      <a:round/>
-                      <a:headEnd type="none" w="med" len="med"/>
-                      <a:tailEnd type="none" w="med" len="med"/>
-                    </a:lnB>
-                  </a:tcPr>
-                </a:tc>
-                <a:tc>
-                  <a:txBody>
-                    <a:bodyPr/>
-                    <a:lstStyle/>
-                    <a:p>
-                      <a:pPr lvl="1" algn="ctr" rtl="0" fontAlgn="t">
-                        <a:buNone/>
-                      </a:pPr>
-                      <a:r>
-                        <a:rPr lang="en-US" sz="1300" b="0" u="none" strike="noStrike">
-                          <a:solidFill>
-                            <a:srgbClr val="000000"/>
-                          </a:solidFill>
-                          <a:effectLst/>
-                        </a:rPr>
-                        <a:t>HSE South West</a:t>
-                      </a:r>
-                      <a:endParaRPr lang="en-US" sz="1300" dirty="0">
-                        <a:effectLst/>
-                      </a:endParaRPr>
-                    </a:p>
-                  </a:txBody>
-                  <a:tcPr marL="16500" marR="16500" marT="57749" marB="16500">
-                    <a:lnB w="12700" cap="flat" cmpd="sng" algn="ctr">
-                      <a:solidFill>
-                        <a:schemeClr val="tx1"/>
-                      </a:solidFill>
-                      <a:prstDash val="solid"/>
-                      <a:round/>
-                      <a:headEnd type="none" w="med" len="med"/>
-                      <a:tailEnd type="none" w="med" len="med"/>
-                    </a:lnB>
-                  </a:tcPr>
-                </a:tc>
-                <a:extLst>
-                  <a:ext uri="{0D108BD9-81ED-4DB2-BD59-A6C34878D82A}">
-                    <a16:rowId xmlns:a16="http://schemas.microsoft.com/office/drawing/2014/main" val="3192462958"/>
-                  </a:ext>
-                </a:extLst>
-              </a:tr>
-              <a:tr h="272245">
-                <a:tc>
-                  <a:txBody>
-                    <a:bodyPr/>
-                    <a:lstStyle/>
-                    <a:p>
-                      <a:pPr lvl="1" algn="ctr" rtl="0" fontAlgn="t">
-                        <a:buNone/>
-                      </a:pPr>
-                      <a:r>
-                        <a:rPr lang="en-US" sz="1300" b="0" u="none" strike="noStrike">
-                          <a:solidFill>
-                            <a:srgbClr val="000000"/>
-                          </a:solidFill>
-                          <a:effectLst/>
-                        </a:rPr>
-                        <a:t>3.82</a:t>
-                      </a:r>
-                      <a:endParaRPr lang="en-US" sz="1300">
-                        <a:effectLst/>
-                      </a:endParaRPr>
-                    </a:p>
-                  </a:txBody>
-                  <a:tcPr marL="16500" marR="16500" marT="57749" marB="16500">
-                    <a:lnT w="12700" cap="flat" cmpd="sng" algn="ctr">
-                      <a:solidFill>
-                        <a:schemeClr val="tx1"/>
-                      </a:solidFill>
-                      <a:prstDash val="solid"/>
-                      <a:round/>
-                      <a:headEnd type="none" w="med" len="med"/>
-                      <a:tailEnd type="none" w="med" len="med"/>
-                    </a:lnT>
-                  </a:tcPr>
-                </a:tc>
-                <a:tc>
-                  <a:txBody>
-                    <a:bodyPr/>
-                    <a:lstStyle/>
-                    <a:p>
-                      <a:pPr lvl="1" algn="ctr" rtl="0" fontAlgn="t">
-                        <a:buNone/>
-                      </a:pPr>
-                      <a:r>
-                        <a:rPr lang="en-US" sz="1300" b="0" u="none" strike="noStrike">
-                          <a:solidFill>
-                            <a:srgbClr val="000000"/>
-                          </a:solidFill>
-                          <a:effectLst/>
-                        </a:rPr>
-                        <a:t>3.45</a:t>
-                      </a:r>
-                      <a:endParaRPr lang="en-US" sz="1300">
-                        <a:effectLst/>
-                      </a:endParaRPr>
-                    </a:p>
-                  </a:txBody>
-                  <a:tcPr marL="16500" marR="16500" marT="57749" marB="16500">
-                    <a:lnT w="12700" cap="flat" cmpd="sng" algn="ctr">
-                      <a:solidFill>
-                        <a:schemeClr val="tx1"/>
-                      </a:solidFill>
-                      <a:prstDash val="solid"/>
-                      <a:round/>
-                      <a:headEnd type="none" w="med" len="med"/>
-                      <a:tailEnd type="none" w="med" len="med"/>
-                    </a:lnT>
-                  </a:tcPr>
-                </a:tc>
-                <a:tc>
-                  <a:txBody>
-                    <a:bodyPr/>
-                    <a:lstStyle/>
-                    <a:p>
-                      <a:pPr lvl="1" algn="ctr" rtl="0" fontAlgn="t">
-                        <a:buNone/>
-                      </a:pPr>
-                      <a:r>
-                        <a:rPr lang="en-US" sz="1300" b="0" u="none" strike="noStrike">
-                          <a:solidFill>
-                            <a:srgbClr val="000000"/>
-                          </a:solidFill>
-                          <a:effectLst/>
-                        </a:rPr>
-                        <a:t>4.18</a:t>
-                      </a:r>
-                      <a:endParaRPr lang="en-US" sz="1300" dirty="0">
-                        <a:effectLst/>
-                      </a:endParaRPr>
-                    </a:p>
-                  </a:txBody>
-                  <a:tcPr marL="16500" marR="16500" marT="57749" marB="16500">
-                    <a:lnT w="12700" cap="flat" cmpd="sng" algn="ctr">
-                      <a:solidFill>
-                        <a:schemeClr val="tx1"/>
-                      </a:solidFill>
-                      <a:prstDash val="solid"/>
-                      <a:round/>
-                      <a:headEnd type="none" w="med" len="med"/>
-                      <a:tailEnd type="none" w="med" len="med"/>
-                    </a:lnT>
-                  </a:tcPr>
-                </a:tc>
-                <a:tc>
-                  <a:txBody>
-                    <a:bodyPr/>
-                    <a:lstStyle/>
-                    <a:p>
-                      <a:pPr lvl="1" algn="ctr" rtl="0" fontAlgn="t">
-                        <a:buNone/>
-                      </a:pPr>
-                      <a:r>
-                        <a:rPr lang="en-US" sz="1300" b="0" u="none" strike="noStrike">
-                          <a:solidFill>
-                            <a:srgbClr val="000000"/>
-                          </a:solidFill>
-                          <a:effectLst/>
-                        </a:rPr>
-                        <a:t>HSE Dublin and Midlands</a:t>
-                      </a:r>
-                      <a:endParaRPr lang="en-US" sz="1300">
-                        <a:effectLst/>
-                      </a:endParaRPr>
-                    </a:p>
-                  </a:txBody>
-                  <a:tcPr marL="16500" marR="16500" marT="57749" marB="16500">
-                    <a:lnT w="12700" cap="flat" cmpd="sng" algn="ctr">
-                      <a:solidFill>
-                        <a:schemeClr val="tx1"/>
-                      </a:solidFill>
-                      <a:prstDash val="solid"/>
-                      <a:round/>
-                      <a:headEnd type="none" w="med" len="med"/>
-                      <a:tailEnd type="none" w="med" len="med"/>
-                    </a:lnT>
-                  </a:tcPr>
-                </a:tc>
-                <a:extLst>
-                  <a:ext uri="{0D108BD9-81ED-4DB2-BD59-A6C34878D82A}">
-                    <a16:rowId xmlns:a16="http://schemas.microsoft.com/office/drawing/2014/main" val="2759746173"/>
-                  </a:ext>
-                </a:extLst>
-              </a:tr>
-              <a:tr h="272245">
-                <a:tc>
-                  <a:txBody>
-                    <a:bodyPr/>
-                    <a:lstStyle/>
-                    <a:p>
-                      <a:pPr lvl="1" algn="ctr" rtl="0" fontAlgn="t">
-                        <a:buNone/>
-                      </a:pPr>
-                      <a:r>
-                        <a:rPr lang="en-US" sz="1300" b="0" u="none" strike="noStrike">
-                          <a:solidFill>
-                            <a:srgbClr val="000000"/>
-                          </a:solidFill>
-                          <a:effectLst/>
-                        </a:rPr>
-                        <a:t>2.87</a:t>
-                      </a:r>
-                      <a:endParaRPr lang="en-US" sz="1300">
-                        <a:effectLst/>
-                      </a:endParaRPr>
-                    </a:p>
-                  </a:txBody>
-                  <a:tcPr marL="16500" marR="16500" marT="57749" marB="16500"/>
-                </a:tc>
-                <a:tc>
-                  <a:txBody>
-                    <a:bodyPr/>
-                    <a:lstStyle/>
-                    <a:p>
-                      <a:pPr lvl="1" algn="ctr" rtl="0" fontAlgn="t">
-                        <a:buNone/>
-                      </a:pPr>
-                      <a:r>
-                        <a:rPr lang="en-US" sz="1300" b="0" u="none" strike="noStrike">
-                          <a:solidFill>
-                            <a:srgbClr val="000000"/>
-                          </a:solidFill>
-                          <a:effectLst/>
-                        </a:rPr>
-                        <a:t>2.6</a:t>
-                      </a:r>
-                      <a:endParaRPr lang="en-US" sz="1300">
-                        <a:effectLst/>
-                      </a:endParaRPr>
-                    </a:p>
-                  </a:txBody>
-                  <a:tcPr marL="16500" marR="16500" marT="57749" marB="16500"/>
-                </a:tc>
-                <a:tc>
-                  <a:txBody>
-                    <a:bodyPr/>
-                    <a:lstStyle/>
-                    <a:p>
-                      <a:pPr lvl="1" algn="ctr" rtl="0" fontAlgn="t">
-                        <a:buNone/>
-                      </a:pPr>
-                      <a:r>
-                        <a:rPr lang="en-US" sz="1300" b="0" u="none" strike="noStrike">
-                          <a:solidFill>
-                            <a:srgbClr val="000000"/>
-                          </a:solidFill>
-                          <a:effectLst/>
-                        </a:rPr>
-                        <a:t>3.13</a:t>
-                      </a:r>
-                      <a:endParaRPr lang="en-US" sz="1300">
-                        <a:effectLst/>
-                      </a:endParaRPr>
-                    </a:p>
-                  </a:txBody>
-                  <a:tcPr marL="16500" marR="16500" marT="57749" marB="16500"/>
-                </a:tc>
-                <a:tc>
-                  <a:txBody>
-                    <a:bodyPr/>
-                    <a:lstStyle/>
-                    <a:p>
-                      <a:pPr lvl="1" algn="ctr" rtl="0" fontAlgn="t">
-                        <a:buNone/>
-                      </a:pPr>
-                      <a:r>
-                        <a:rPr lang="en-US" sz="1300" b="0" u="none" strike="noStrike">
-                          <a:solidFill>
-                            <a:srgbClr val="000000"/>
-                          </a:solidFill>
-                          <a:effectLst/>
-                        </a:rPr>
-                        <a:t>HSE Dublin and South East</a:t>
-                      </a:r>
-                      <a:endParaRPr lang="en-US" sz="1300" dirty="0">
-                        <a:effectLst/>
-                      </a:endParaRPr>
-                    </a:p>
-                  </a:txBody>
-                  <a:tcPr marL="16500" marR="16500" marT="57749" marB="16500"/>
-                </a:tc>
-                <a:extLst>
-                  <a:ext uri="{0D108BD9-81ED-4DB2-BD59-A6C34878D82A}">
-                    <a16:rowId xmlns:a16="http://schemas.microsoft.com/office/drawing/2014/main" val="2869726007"/>
-                  </a:ext>
-                </a:extLst>
-              </a:tr>
-              <a:tr h="272245">
-                <a:tc>
-                  <a:txBody>
-                    <a:bodyPr/>
-                    <a:lstStyle/>
-                    <a:p>
-                      <a:pPr lvl="1" algn="ctr" rtl="0" fontAlgn="t">
-                        <a:buNone/>
-                      </a:pPr>
-                      <a:r>
-                        <a:rPr lang="en-US" sz="1300" b="0" u="none" strike="noStrike">
-                          <a:solidFill>
-                            <a:srgbClr val="000000"/>
-                          </a:solidFill>
-                          <a:effectLst/>
-                        </a:rPr>
-                        <a:t>2.18</a:t>
-                      </a:r>
-                      <a:endParaRPr lang="en-US" sz="1300">
-                        <a:effectLst/>
-                      </a:endParaRPr>
-                    </a:p>
-                  </a:txBody>
-                  <a:tcPr marL="16500" marR="16500" marT="57749" marB="16500"/>
-                </a:tc>
-                <a:tc>
-                  <a:txBody>
-                    <a:bodyPr/>
-                    <a:lstStyle/>
-                    <a:p>
-                      <a:pPr lvl="1" algn="ctr" rtl="0" fontAlgn="t">
-                        <a:buNone/>
-                      </a:pPr>
-                      <a:r>
-                        <a:rPr lang="en-US" sz="1300" b="0" u="none" strike="noStrike">
-                          <a:solidFill>
-                            <a:srgbClr val="000000"/>
-                          </a:solidFill>
-                          <a:effectLst/>
-                        </a:rPr>
-                        <a:t>1.94</a:t>
-                      </a:r>
-                      <a:endParaRPr lang="en-US" sz="1300" dirty="0">
-                        <a:effectLst/>
-                      </a:endParaRPr>
-                    </a:p>
-                  </a:txBody>
-                  <a:tcPr marL="16500" marR="16500" marT="57749" marB="16500"/>
-                </a:tc>
-                <a:tc>
-                  <a:txBody>
-                    <a:bodyPr/>
-                    <a:lstStyle/>
-                    <a:p>
-                      <a:pPr lvl="1" algn="ctr" rtl="0" fontAlgn="t">
-                        <a:buNone/>
-                      </a:pPr>
-                      <a:r>
-                        <a:rPr lang="en-US" sz="1300" b="0" u="none" strike="noStrike">
-                          <a:solidFill>
-                            <a:srgbClr val="000000"/>
-                          </a:solidFill>
-                          <a:effectLst/>
-                        </a:rPr>
-                        <a:t>2.41</a:t>
-                      </a:r>
-                      <a:endParaRPr lang="en-US" sz="1300" dirty="0">
-                        <a:effectLst/>
-                      </a:endParaRPr>
-                    </a:p>
-                  </a:txBody>
-                  <a:tcPr marL="16500" marR="16500" marT="57749" marB="16500"/>
-                </a:tc>
-                <a:tc>
-                  <a:txBody>
-                    <a:bodyPr/>
-                    <a:lstStyle/>
-                    <a:p>
-                      <a:pPr lvl="1" algn="ctr" rtl="0" fontAlgn="t">
-                        <a:buNone/>
-                      </a:pPr>
-                      <a:r>
-                        <a:rPr lang="en-US" sz="1300" b="0" u="none" strike="noStrike" dirty="0">
-                          <a:solidFill>
-                            <a:srgbClr val="000000"/>
-                          </a:solidFill>
-                          <a:effectLst/>
-                        </a:rPr>
-                        <a:t>HSE Dublin and North East</a:t>
-                      </a:r>
-                      <a:endParaRPr lang="en-US" sz="1300" dirty="0">
-                        <a:effectLst/>
-                      </a:endParaRPr>
-                    </a:p>
-                  </a:txBody>
-                  <a:tcPr marL="16500" marR="16500" marT="57749" marB="16500"/>
-                </a:tc>
-                <a:extLst>
-                  <a:ext uri="{0D108BD9-81ED-4DB2-BD59-A6C34878D82A}">
-                    <a16:rowId xmlns:a16="http://schemas.microsoft.com/office/drawing/2014/main" val="496865087"/>
-                  </a:ext>
-                </a:extLst>
-              </a:tr>
-            </a:tbl>
-          </a:graphicData>
-        </a:graphic>
-      </p:graphicFrame>
       <mc:AlternateContent xmlns:mc="http://schemas.openxmlformats.org/markup-compatibility/2006">
         <mc:Choice xmlns:a14="http://schemas.microsoft.com/office/drawing/2010/main" Requires="a14">
           <p:sp>
@@ -15514,7 +14461,7 @@
             </p:nvSpPr>
             <p:spPr>
               <a:xfrm>
-                <a:off x="15526764" y="12518772"/>
+                <a:off x="15747773" y="12513919"/>
                 <a:ext cx="584155" cy="399789"/>
               </a:xfrm>
               <a:prstGeom prst="rect">
@@ -15566,7 +14513,7 @@
             </p:nvSpPr>
             <p:spPr>
               <a:xfrm>
-                <a:off x="15526764" y="12518772"/>
+                <a:off x="15747773" y="12513919"/>
                 <a:ext cx="584155" cy="399789"/>
               </a:xfrm>
               <a:prstGeom prst="rect">
@@ -15575,7 +14522,7 @@
               <a:blipFill>
                 <a:blip r:embed="rId25"/>
                 <a:stretch>
-                  <a:fillRect l="-12766" t="-24242" b="-45455"/>
+                  <a:fillRect l="-12766" t="-25000" b="-46875"/>
                 </a:stretch>
               </a:blipFill>
             </p:spPr>
@@ -15754,6 +14701,2189 @@
           </a:p>
         </p:txBody>
       </p:sp>
+      <p:graphicFrame>
+        <p:nvGraphicFramePr>
+          <p:cNvPr id="36" name="Table 35">
+            <a:extLst>
+              <a:ext uri="{FF2B5EF4-FFF2-40B4-BE49-F238E27FC236}">
+                <a16:creationId xmlns:a16="http://schemas.microsoft.com/office/drawing/2014/main" id="{2D7358FA-850B-0006-AFCB-6D870856E2F3}"/>
+              </a:ext>
+            </a:extLst>
+          </p:cNvPr>
+          <p:cNvGraphicFramePr>
+            <a:graphicFrameLocks noGrp="1"/>
+          </p:cNvGraphicFramePr>
+          <p:nvPr>
+            <p:extLst>
+              <p:ext uri="{D42A27DB-BD31-4B8C-83A1-F6EECF244321}">
+                <p14:modId xmlns:p14="http://schemas.microsoft.com/office/powerpoint/2010/main" val="3429147928"/>
+              </p:ext>
+            </p:extLst>
+          </p:nvPr>
+        </p:nvGraphicFramePr>
+        <p:xfrm>
+          <a:off x="16229644" y="11656798"/>
+          <a:ext cx="5288736" cy="2026920"/>
+        </p:xfrm>
+        <a:graphic>
+          <a:graphicData uri="http://schemas.openxmlformats.org/drawingml/2006/table">
+            <a:tbl>
+              <a:tblPr/>
+              <a:tblGrid>
+                <a:gridCol w="728599">
+                  <a:extLst>
+                    <a:ext uri="{9D8B030D-6E8A-4147-A177-3AD203B41FA5}">
+                      <a16:colId xmlns:a16="http://schemas.microsoft.com/office/drawing/2014/main" val="2783686909"/>
+                    </a:ext>
+                  </a:extLst>
+                </a:gridCol>
+                <a:gridCol w="590811">
+                  <a:extLst>
+                    <a:ext uri="{9D8B030D-6E8A-4147-A177-3AD203B41FA5}">
+                      <a16:colId xmlns:a16="http://schemas.microsoft.com/office/drawing/2014/main" val="1474897673"/>
+                    </a:ext>
+                  </a:extLst>
+                </a:gridCol>
+                <a:gridCol w="695460">
+                  <a:extLst>
+                    <a:ext uri="{9D8B030D-6E8A-4147-A177-3AD203B41FA5}">
+                      <a16:colId xmlns:a16="http://schemas.microsoft.com/office/drawing/2014/main" val="20465917"/>
+                    </a:ext>
+                  </a:extLst>
+                </a:gridCol>
+                <a:gridCol w="3273866">
+                  <a:extLst>
+                    <a:ext uri="{9D8B030D-6E8A-4147-A177-3AD203B41FA5}">
+                      <a16:colId xmlns:a16="http://schemas.microsoft.com/office/drawing/2014/main" val="130274467"/>
+                    </a:ext>
+                  </a:extLst>
+                </a:gridCol>
+              </a:tblGrid>
+              <a:tr h="0">
+                <a:tc>
+                  <a:txBody>
+                    <a:bodyPr/>
+                    <a:lstStyle/>
+                    <a:p>
+                      <a:pPr algn="ctr">
+                        <a:buNone/>
+                      </a:pPr>
+                      <a:r>
+                        <a:rPr lang="en-US" sz="1300" dirty="0">
+                          <a:effectLst/>
+                          <a:latin typeface="Fira Sans" panose="020B0503050000020004" pitchFamily="34" charset="0"/>
+                        </a:rPr>
+                        <a:t>Mean</a:t>
+                      </a:r>
+                    </a:p>
+                  </a:txBody>
+                  <a:tcPr anchor="ctr">
+                    <a:lnL w="12700" cap="flat" cmpd="sng" algn="ctr">
+                      <a:solidFill>
+                        <a:schemeClr val="tx1"/>
+                      </a:solidFill>
+                      <a:prstDash val="solid"/>
+                      <a:round/>
+                      <a:headEnd type="none" w="med" len="med"/>
+                      <a:tailEnd type="none" w="med" len="med"/>
+                    </a:lnL>
+                    <a:lnR w="12700" cap="flat" cmpd="sng" algn="ctr">
+                      <a:solidFill>
+                        <a:schemeClr val="tx1"/>
+                      </a:solidFill>
+                      <a:prstDash val="solid"/>
+                      <a:round/>
+                      <a:headEnd type="none" w="med" len="med"/>
+                      <a:tailEnd type="none" w="med" len="med"/>
+                    </a:lnR>
+                    <a:lnT w="12700" cap="flat" cmpd="sng" algn="ctr">
+                      <a:solidFill>
+                        <a:schemeClr val="tx1"/>
+                      </a:solidFill>
+                      <a:prstDash val="solid"/>
+                      <a:round/>
+                      <a:headEnd type="none" w="med" len="med"/>
+                      <a:tailEnd type="none" w="med" len="med"/>
+                    </a:lnT>
+                    <a:lnB w="12700" cap="flat" cmpd="sng" algn="ctr">
+                      <a:solidFill>
+                        <a:schemeClr val="tx1"/>
+                      </a:solidFill>
+                      <a:prstDash val="solid"/>
+                      <a:round/>
+                      <a:headEnd type="none" w="med" len="med"/>
+                      <a:tailEnd type="none" w="med" len="med"/>
+                    </a:lnB>
+                    <a:lnTlToBr w="12700" cmpd="sng">
+                      <a:noFill/>
+                      <a:prstDash val="solid"/>
+                    </a:lnTlToBr>
+                    <a:lnBlToTr w="12700" cmpd="sng">
+                      <a:noFill/>
+                      <a:prstDash val="solid"/>
+                    </a:lnBlToTr>
+                    <a:noFill/>
+                  </a:tcPr>
+                </a:tc>
+                <a:tc>
+                  <a:txBody>
+                    <a:bodyPr/>
+                    <a:lstStyle/>
+                    <a:p>
+                      <a:pPr algn="ctr">
+                        <a:buNone/>
+                      </a:pPr>
+                      <a:r>
+                        <a:rPr lang="en-US" sz="1300" dirty="0">
+                          <a:effectLst/>
+                          <a:latin typeface="Fira Sans" panose="020B0503050000020004" pitchFamily="34" charset="0"/>
+                        </a:rPr>
+                        <a:t>2.5%</a:t>
+                      </a:r>
+                    </a:p>
+                  </a:txBody>
+                  <a:tcPr anchor="ctr">
+                    <a:lnL w="12700" cap="flat" cmpd="sng" algn="ctr">
+                      <a:solidFill>
+                        <a:schemeClr val="tx1"/>
+                      </a:solidFill>
+                      <a:prstDash val="solid"/>
+                      <a:round/>
+                      <a:headEnd type="none" w="med" len="med"/>
+                      <a:tailEnd type="none" w="med" len="med"/>
+                    </a:lnL>
+                    <a:lnR w="12700" cap="flat" cmpd="sng" algn="ctr">
+                      <a:solidFill>
+                        <a:schemeClr val="tx1"/>
+                      </a:solidFill>
+                      <a:prstDash val="solid"/>
+                      <a:round/>
+                      <a:headEnd type="none" w="med" len="med"/>
+                      <a:tailEnd type="none" w="med" len="med"/>
+                    </a:lnR>
+                    <a:lnT w="12700" cap="flat" cmpd="sng" algn="ctr">
+                      <a:solidFill>
+                        <a:schemeClr val="tx1"/>
+                      </a:solidFill>
+                      <a:prstDash val="solid"/>
+                      <a:round/>
+                      <a:headEnd type="none" w="med" len="med"/>
+                      <a:tailEnd type="none" w="med" len="med"/>
+                    </a:lnT>
+                    <a:lnB w="12700" cap="flat" cmpd="sng" algn="ctr">
+                      <a:solidFill>
+                        <a:schemeClr val="tx1"/>
+                      </a:solidFill>
+                      <a:prstDash val="solid"/>
+                      <a:round/>
+                      <a:headEnd type="none" w="med" len="med"/>
+                      <a:tailEnd type="none" w="med" len="med"/>
+                    </a:lnB>
+                    <a:lnTlToBr w="12700" cmpd="sng">
+                      <a:noFill/>
+                      <a:prstDash val="solid"/>
+                    </a:lnTlToBr>
+                    <a:lnBlToTr w="12700" cmpd="sng">
+                      <a:noFill/>
+                      <a:prstDash val="solid"/>
+                    </a:lnBlToTr>
+                    <a:noFill/>
+                  </a:tcPr>
+                </a:tc>
+                <a:tc>
+                  <a:txBody>
+                    <a:bodyPr/>
+                    <a:lstStyle/>
+                    <a:p>
+                      <a:pPr algn="ctr">
+                        <a:buNone/>
+                      </a:pPr>
+                      <a:r>
+                        <a:rPr lang="en-US" sz="1300" dirty="0">
+                          <a:effectLst/>
+                          <a:latin typeface="Fira Sans" panose="020B0503050000020004" pitchFamily="34" charset="0"/>
+                        </a:rPr>
+                        <a:t>97.5%</a:t>
+                      </a:r>
+                    </a:p>
+                  </a:txBody>
+                  <a:tcPr anchor="ctr">
+                    <a:lnL w="12700" cap="flat" cmpd="sng" algn="ctr">
+                      <a:solidFill>
+                        <a:schemeClr val="tx1"/>
+                      </a:solidFill>
+                      <a:prstDash val="solid"/>
+                      <a:round/>
+                      <a:headEnd type="none" w="med" len="med"/>
+                      <a:tailEnd type="none" w="med" len="med"/>
+                    </a:lnL>
+                    <a:lnR w="12700" cap="flat" cmpd="sng" algn="ctr">
+                      <a:solidFill>
+                        <a:schemeClr val="tx1"/>
+                      </a:solidFill>
+                      <a:prstDash val="solid"/>
+                      <a:round/>
+                      <a:headEnd type="none" w="med" len="med"/>
+                      <a:tailEnd type="none" w="med" len="med"/>
+                    </a:lnR>
+                    <a:lnT w="12700" cap="flat" cmpd="sng" algn="ctr">
+                      <a:solidFill>
+                        <a:schemeClr val="tx1"/>
+                      </a:solidFill>
+                      <a:prstDash val="solid"/>
+                      <a:round/>
+                      <a:headEnd type="none" w="med" len="med"/>
+                      <a:tailEnd type="none" w="med" len="med"/>
+                    </a:lnT>
+                    <a:lnB w="12700" cap="flat" cmpd="sng" algn="ctr">
+                      <a:solidFill>
+                        <a:schemeClr val="tx1"/>
+                      </a:solidFill>
+                      <a:prstDash val="solid"/>
+                      <a:round/>
+                      <a:headEnd type="none" w="med" len="med"/>
+                      <a:tailEnd type="none" w="med" len="med"/>
+                    </a:lnB>
+                    <a:lnTlToBr w="12700" cmpd="sng">
+                      <a:noFill/>
+                      <a:prstDash val="solid"/>
+                    </a:lnTlToBr>
+                    <a:lnBlToTr w="12700" cmpd="sng">
+                      <a:noFill/>
+                      <a:prstDash val="solid"/>
+                    </a:lnBlToTr>
+                    <a:noFill/>
+                  </a:tcPr>
+                </a:tc>
+                <a:tc>
+                  <a:txBody>
+                    <a:bodyPr/>
+                    <a:lstStyle/>
+                    <a:p>
+                      <a:pPr algn="ctr">
+                        <a:buNone/>
+                      </a:pPr>
+                      <a:r>
+                        <a:rPr lang="en-US" sz="1300" dirty="0">
+                          <a:effectLst/>
+                          <a:latin typeface="Fira Sans" panose="020B0503050000020004" pitchFamily="34" charset="0"/>
+                        </a:rPr>
+                        <a:t>Region</a:t>
+                      </a:r>
+                    </a:p>
+                  </a:txBody>
+                  <a:tcPr anchor="ctr">
+                    <a:lnL w="12700" cap="flat" cmpd="sng" algn="ctr">
+                      <a:solidFill>
+                        <a:schemeClr val="tx1"/>
+                      </a:solidFill>
+                      <a:prstDash val="solid"/>
+                      <a:round/>
+                      <a:headEnd type="none" w="med" len="med"/>
+                      <a:tailEnd type="none" w="med" len="med"/>
+                    </a:lnL>
+                    <a:lnR w="12700" cap="flat" cmpd="sng" algn="ctr">
+                      <a:solidFill>
+                        <a:schemeClr val="tx1"/>
+                      </a:solidFill>
+                      <a:prstDash val="solid"/>
+                      <a:round/>
+                      <a:headEnd type="none" w="med" len="med"/>
+                      <a:tailEnd type="none" w="med" len="med"/>
+                    </a:lnR>
+                    <a:lnT w="12700" cap="flat" cmpd="sng" algn="ctr">
+                      <a:solidFill>
+                        <a:schemeClr val="tx1"/>
+                      </a:solidFill>
+                      <a:prstDash val="solid"/>
+                      <a:round/>
+                      <a:headEnd type="none" w="med" len="med"/>
+                      <a:tailEnd type="none" w="med" len="med"/>
+                    </a:lnT>
+                    <a:lnB w="12700" cap="flat" cmpd="sng" algn="ctr">
+                      <a:solidFill>
+                        <a:schemeClr val="tx1"/>
+                      </a:solidFill>
+                      <a:prstDash val="solid"/>
+                      <a:round/>
+                      <a:headEnd type="none" w="med" len="med"/>
+                      <a:tailEnd type="none" w="med" len="med"/>
+                    </a:lnB>
+                    <a:lnTlToBr w="12700" cmpd="sng">
+                      <a:noFill/>
+                      <a:prstDash val="solid"/>
+                    </a:lnTlToBr>
+                    <a:lnBlToTr w="12700" cmpd="sng">
+                      <a:noFill/>
+                      <a:prstDash val="solid"/>
+                    </a:lnBlToTr>
+                    <a:noFill/>
+                  </a:tcPr>
+                </a:tc>
+                <a:extLst>
+                  <a:ext uri="{0D108BD9-81ED-4DB2-BD59-A6C34878D82A}">
+                    <a16:rowId xmlns:a16="http://schemas.microsoft.com/office/drawing/2014/main" val="977072208"/>
+                  </a:ext>
+                </a:extLst>
+              </a:tr>
+              <a:tr h="259265">
+                <a:tc>
+                  <a:txBody>
+                    <a:bodyPr/>
+                    <a:lstStyle/>
+                    <a:p>
+                      <a:pPr algn="ctr">
+                        <a:buNone/>
+                      </a:pPr>
+                      <a:r>
+                        <a:rPr lang="en-US" sz="1300" dirty="0">
+                          <a:effectLst/>
+                          <a:latin typeface="Fira Sans" panose="020B0503050000020004" pitchFamily="34" charset="0"/>
+                        </a:rPr>
+                        <a:t>0.39</a:t>
+                      </a:r>
+                    </a:p>
+                  </a:txBody>
+                  <a:tcPr anchor="ctr">
+                    <a:lnL w="12700" cap="flat" cmpd="sng" algn="ctr">
+                      <a:solidFill>
+                        <a:schemeClr val="bg2">
+                          <a:lumMod val="40000"/>
+                          <a:lumOff val="60000"/>
+                        </a:schemeClr>
+                      </a:solidFill>
+                      <a:prstDash val="solid"/>
+                      <a:round/>
+                      <a:headEnd type="none" w="med" len="med"/>
+                      <a:tailEnd type="none" w="med" len="med"/>
+                    </a:lnL>
+                    <a:lnR w="12700" cap="flat" cmpd="sng" algn="ctr">
+                      <a:solidFill>
+                        <a:schemeClr val="bg2">
+                          <a:lumMod val="40000"/>
+                          <a:lumOff val="60000"/>
+                        </a:schemeClr>
+                      </a:solidFill>
+                      <a:prstDash val="solid"/>
+                      <a:round/>
+                      <a:headEnd type="none" w="med" len="med"/>
+                      <a:tailEnd type="none" w="med" len="med"/>
+                    </a:lnR>
+                    <a:lnT w="12700" cap="flat" cmpd="sng" algn="ctr">
+                      <a:solidFill>
+                        <a:schemeClr val="tx1"/>
+                      </a:solidFill>
+                      <a:prstDash val="solid"/>
+                      <a:round/>
+                      <a:headEnd type="none" w="med" len="med"/>
+                      <a:tailEnd type="none" w="med" len="med"/>
+                    </a:lnT>
+                    <a:lnB w="12700" cap="flat" cmpd="sng" algn="ctr">
+                      <a:solidFill>
+                        <a:schemeClr val="bg2">
+                          <a:lumMod val="40000"/>
+                          <a:lumOff val="60000"/>
+                        </a:schemeClr>
+                      </a:solidFill>
+                      <a:prstDash val="solid"/>
+                      <a:round/>
+                      <a:headEnd type="none" w="med" len="med"/>
+                      <a:tailEnd type="none" w="med" len="med"/>
+                    </a:lnB>
+                    <a:lnTlToBr w="12700" cmpd="sng">
+                      <a:noFill/>
+                      <a:prstDash val="solid"/>
+                    </a:lnTlToBr>
+                    <a:lnBlToTr w="12700" cmpd="sng">
+                      <a:noFill/>
+                      <a:prstDash val="solid"/>
+                    </a:lnBlToTr>
+                    <a:noFill/>
+                  </a:tcPr>
+                </a:tc>
+                <a:tc>
+                  <a:txBody>
+                    <a:bodyPr/>
+                    <a:lstStyle/>
+                    <a:p>
+                      <a:pPr algn="ctr">
+                        <a:buNone/>
+                      </a:pPr>
+                      <a:r>
+                        <a:rPr lang="en-US" sz="1300">
+                          <a:effectLst/>
+                          <a:latin typeface="Fira Sans" panose="020B0503050000020004" pitchFamily="34" charset="0"/>
+                        </a:rPr>
+                        <a:t>0.31</a:t>
+                      </a:r>
+                    </a:p>
+                  </a:txBody>
+                  <a:tcPr anchor="ctr">
+                    <a:lnL w="12700" cap="flat" cmpd="sng" algn="ctr">
+                      <a:solidFill>
+                        <a:schemeClr val="bg2">
+                          <a:lumMod val="40000"/>
+                          <a:lumOff val="60000"/>
+                        </a:schemeClr>
+                      </a:solidFill>
+                      <a:prstDash val="solid"/>
+                      <a:round/>
+                      <a:headEnd type="none" w="med" len="med"/>
+                      <a:tailEnd type="none" w="med" len="med"/>
+                    </a:lnL>
+                    <a:lnR w="12700" cap="flat" cmpd="sng" algn="ctr">
+                      <a:solidFill>
+                        <a:schemeClr val="bg2">
+                          <a:lumMod val="40000"/>
+                          <a:lumOff val="60000"/>
+                        </a:schemeClr>
+                      </a:solidFill>
+                      <a:prstDash val="solid"/>
+                      <a:round/>
+                      <a:headEnd type="none" w="med" len="med"/>
+                      <a:tailEnd type="none" w="med" len="med"/>
+                    </a:lnR>
+                    <a:lnT w="12700" cap="flat" cmpd="sng" algn="ctr">
+                      <a:solidFill>
+                        <a:schemeClr val="tx1"/>
+                      </a:solidFill>
+                      <a:prstDash val="solid"/>
+                      <a:round/>
+                      <a:headEnd type="none" w="med" len="med"/>
+                      <a:tailEnd type="none" w="med" len="med"/>
+                    </a:lnT>
+                    <a:lnB w="12700" cap="flat" cmpd="sng" algn="ctr">
+                      <a:solidFill>
+                        <a:schemeClr val="bg2">
+                          <a:lumMod val="40000"/>
+                          <a:lumOff val="60000"/>
+                        </a:schemeClr>
+                      </a:solidFill>
+                      <a:prstDash val="solid"/>
+                      <a:round/>
+                      <a:headEnd type="none" w="med" len="med"/>
+                      <a:tailEnd type="none" w="med" len="med"/>
+                    </a:lnB>
+                    <a:lnTlToBr w="12700" cmpd="sng">
+                      <a:noFill/>
+                      <a:prstDash val="solid"/>
+                    </a:lnTlToBr>
+                    <a:lnBlToTr w="12700" cmpd="sng">
+                      <a:noFill/>
+                      <a:prstDash val="solid"/>
+                    </a:lnBlToTr>
+                    <a:noFill/>
+                  </a:tcPr>
+                </a:tc>
+                <a:tc>
+                  <a:txBody>
+                    <a:bodyPr/>
+                    <a:lstStyle/>
+                    <a:p>
+                      <a:pPr algn="ctr">
+                        <a:buNone/>
+                      </a:pPr>
+                      <a:r>
+                        <a:rPr lang="en-US" sz="1300">
+                          <a:effectLst/>
+                          <a:latin typeface="Fira Sans" panose="020B0503050000020004" pitchFamily="34" charset="0"/>
+                        </a:rPr>
+                        <a:t>0.48</a:t>
+                      </a:r>
+                    </a:p>
+                  </a:txBody>
+                  <a:tcPr anchor="ctr">
+                    <a:lnL w="12700" cap="flat" cmpd="sng" algn="ctr">
+                      <a:solidFill>
+                        <a:schemeClr val="bg2">
+                          <a:lumMod val="40000"/>
+                          <a:lumOff val="60000"/>
+                        </a:schemeClr>
+                      </a:solidFill>
+                      <a:prstDash val="solid"/>
+                      <a:round/>
+                      <a:headEnd type="none" w="med" len="med"/>
+                      <a:tailEnd type="none" w="med" len="med"/>
+                    </a:lnL>
+                    <a:lnR w="12700" cap="flat" cmpd="sng" algn="ctr">
+                      <a:solidFill>
+                        <a:schemeClr val="bg2">
+                          <a:lumMod val="40000"/>
+                          <a:lumOff val="60000"/>
+                        </a:schemeClr>
+                      </a:solidFill>
+                      <a:prstDash val="solid"/>
+                      <a:round/>
+                      <a:headEnd type="none" w="med" len="med"/>
+                      <a:tailEnd type="none" w="med" len="med"/>
+                    </a:lnR>
+                    <a:lnT w="12700" cap="flat" cmpd="sng" algn="ctr">
+                      <a:solidFill>
+                        <a:schemeClr val="tx1"/>
+                      </a:solidFill>
+                      <a:prstDash val="solid"/>
+                      <a:round/>
+                      <a:headEnd type="none" w="med" len="med"/>
+                      <a:tailEnd type="none" w="med" len="med"/>
+                    </a:lnT>
+                    <a:lnB w="12700" cap="flat" cmpd="sng" algn="ctr">
+                      <a:solidFill>
+                        <a:schemeClr val="bg2">
+                          <a:lumMod val="40000"/>
+                          <a:lumOff val="60000"/>
+                        </a:schemeClr>
+                      </a:solidFill>
+                      <a:prstDash val="solid"/>
+                      <a:round/>
+                      <a:headEnd type="none" w="med" len="med"/>
+                      <a:tailEnd type="none" w="med" len="med"/>
+                    </a:lnB>
+                    <a:lnTlToBr w="12700" cmpd="sng">
+                      <a:noFill/>
+                      <a:prstDash val="solid"/>
+                    </a:lnTlToBr>
+                    <a:lnBlToTr w="12700" cmpd="sng">
+                      <a:noFill/>
+                      <a:prstDash val="solid"/>
+                    </a:lnBlToTr>
+                    <a:noFill/>
+                  </a:tcPr>
+                </a:tc>
+                <a:tc>
+                  <a:txBody>
+                    <a:bodyPr/>
+                    <a:lstStyle/>
+                    <a:p>
+                      <a:pPr algn="ctr">
+                        <a:buNone/>
+                      </a:pPr>
+                      <a:r>
+                        <a:rPr lang="en-US" sz="1300" dirty="0">
+                          <a:effectLst/>
+                          <a:latin typeface="Fira Sans" panose="020B0503050000020004" pitchFamily="34" charset="0"/>
+                        </a:rPr>
+                        <a:t>HSE Mid West</a:t>
+                      </a:r>
+                    </a:p>
+                  </a:txBody>
+                  <a:tcPr anchor="ctr">
+                    <a:lnL w="12700" cap="flat" cmpd="sng" algn="ctr">
+                      <a:solidFill>
+                        <a:schemeClr val="bg2">
+                          <a:lumMod val="40000"/>
+                          <a:lumOff val="60000"/>
+                        </a:schemeClr>
+                      </a:solidFill>
+                      <a:prstDash val="solid"/>
+                      <a:round/>
+                      <a:headEnd type="none" w="med" len="med"/>
+                      <a:tailEnd type="none" w="med" len="med"/>
+                    </a:lnL>
+                    <a:lnR w="12700" cap="flat" cmpd="sng" algn="ctr">
+                      <a:solidFill>
+                        <a:schemeClr val="bg2">
+                          <a:lumMod val="40000"/>
+                          <a:lumOff val="60000"/>
+                        </a:schemeClr>
+                      </a:solidFill>
+                      <a:prstDash val="solid"/>
+                      <a:round/>
+                      <a:headEnd type="none" w="med" len="med"/>
+                      <a:tailEnd type="none" w="med" len="med"/>
+                    </a:lnR>
+                    <a:lnT w="12700" cap="flat" cmpd="sng" algn="ctr">
+                      <a:solidFill>
+                        <a:schemeClr val="tx1"/>
+                      </a:solidFill>
+                      <a:prstDash val="solid"/>
+                      <a:round/>
+                      <a:headEnd type="none" w="med" len="med"/>
+                      <a:tailEnd type="none" w="med" len="med"/>
+                    </a:lnT>
+                    <a:lnB w="12700" cap="flat" cmpd="sng" algn="ctr">
+                      <a:solidFill>
+                        <a:schemeClr val="bg2">
+                          <a:lumMod val="40000"/>
+                          <a:lumOff val="60000"/>
+                        </a:schemeClr>
+                      </a:solidFill>
+                      <a:prstDash val="solid"/>
+                      <a:round/>
+                      <a:headEnd type="none" w="med" len="med"/>
+                      <a:tailEnd type="none" w="med" len="med"/>
+                    </a:lnB>
+                    <a:lnTlToBr w="12700" cmpd="sng">
+                      <a:noFill/>
+                      <a:prstDash val="solid"/>
+                    </a:lnTlToBr>
+                    <a:lnBlToTr w="12700" cmpd="sng">
+                      <a:noFill/>
+                      <a:prstDash val="solid"/>
+                    </a:lnBlToTr>
+                    <a:noFill/>
+                  </a:tcPr>
+                </a:tc>
+                <a:extLst>
+                  <a:ext uri="{0D108BD9-81ED-4DB2-BD59-A6C34878D82A}">
+                    <a16:rowId xmlns:a16="http://schemas.microsoft.com/office/drawing/2014/main" val="1296125086"/>
+                  </a:ext>
+                </a:extLst>
+              </a:tr>
+              <a:tr h="288014">
+                <a:tc>
+                  <a:txBody>
+                    <a:bodyPr/>
+                    <a:lstStyle/>
+                    <a:p>
+                      <a:pPr algn="ctr">
+                        <a:buNone/>
+                      </a:pPr>
+                      <a:r>
+                        <a:rPr lang="en-US" sz="1300">
+                          <a:effectLst/>
+                          <a:latin typeface="Fira Sans" panose="020B0503050000020004" pitchFamily="34" charset="0"/>
+                        </a:rPr>
+                        <a:t>0.51</a:t>
+                      </a:r>
+                    </a:p>
+                  </a:txBody>
+                  <a:tcPr anchor="ctr">
+                    <a:lnL w="12700" cap="flat" cmpd="sng" algn="ctr">
+                      <a:solidFill>
+                        <a:schemeClr val="bg2">
+                          <a:lumMod val="40000"/>
+                          <a:lumOff val="60000"/>
+                        </a:schemeClr>
+                      </a:solidFill>
+                      <a:prstDash val="solid"/>
+                      <a:round/>
+                      <a:headEnd type="none" w="med" len="med"/>
+                      <a:tailEnd type="none" w="med" len="med"/>
+                    </a:lnL>
+                    <a:lnR w="12700" cap="flat" cmpd="sng" algn="ctr">
+                      <a:solidFill>
+                        <a:schemeClr val="bg2">
+                          <a:lumMod val="40000"/>
+                          <a:lumOff val="60000"/>
+                        </a:schemeClr>
+                      </a:solidFill>
+                      <a:prstDash val="solid"/>
+                      <a:round/>
+                      <a:headEnd type="none" w="med" len="med"/>
+                      <a:tailEnd type="none" w="med" len="med"/>
+                    </a:lnR>
+                    <a:lnT w="12700" cap="flat" cmpd="sng" algn="ctr">
+                      <a:solidFill>
+                        <a:schemeClr val="bg2">
+                          <a:lumMod val="40000"/>
+                          <a:lumOff val="60000"/>
+                        </a:schemeClr>
+                      </a:solidFill>
+                      <a:prstDash val="solid"/>
+                      <a:round/>
+                      <a:headEnd type="none" w="med" len="med"/>
+                      <a:tailEnd type="none" w="med" len="med"/>
+                    </a:lnT>
+                    <a:lnB w="12700" cap="flat" cmpd="sng" algn="ctr">
+                      <a:solidFill>
+                        <a:schemeClr val="bg2">
+                          <a:lumMod val="40000"/>
+                          <a:lumOff val="60000"/>
+                        </a:schemeClr>
+                      </a:solidFill>
+                      <a:prstDash val="solid"/>
+                      <a:round/>
+                      <a:headEnd type="none" w="med" len="med"/>
+                      <a:tailEnd type="none" w="med" len="med"/>
+                    </a:lnB>
+                    <a:lnTlToBr w="12700" cmpd="sng">
+                      <a:noFill/>
+                      <a:prstDash val="solid"/>
+                    </a:lnTlToBr>
+                    <a:lnBlToTr w="12700" cmpd="sng">
+                      <a:noFill/>
+                      <a:prstDash val="solid"/>
+                    </a:lnBlToTr>
+                    <a:noFill/>
+                  </a:tcPr>
+                </a:tc>
+                <a:tc>
+                  <a:txBody>
+                    <a:bodyPr/>
+                    <a:lstStyle/>
+                    <a:p>
+                      <a:pPr algn="ctr">
+                        <a:buNone/>
+                      </a:pPr>
+                      <a:r>
+                        <a:rPr lang="en-US" sz="1300">
+                          <a:effectLst/>
+                          <a:latin typeface="Fira Sans" panose="020B0503050000020004" pitchFamily="34" charset="0"/>
+                        </a:rPr>
+                        <a:t>0.40</a:t>
+                      </a:r>
+                    </a:p>
+                  </a:txBody>
+                  <a:tcPr anchor="ctr">
+                    <a:lnL w="12700" cap="flat" cmpd="sng" algn="ctr">
+                      <a:solidFill>
+                        <a:schemeClr val="bg2">
+                          <a:lumMod val="40000"/>
+                          <a:lumOff val="60000"/>
+                        </a:schemeClr>
+                      </a:solidFill>
+                      <a:prstDash val="solid"/>
+                      <a:round/>
+                      <a:headEnd type="none" w="med" len="med"/>
+                      <a:tailEnd type="none" w="med" len="med"/>
+                    </a:lnL>
+                    <a:lnR w="12700" cap="flat" cmpd="sng" algn="ctr">
+                      <a:solidFill>
+                        <a:schemeClr val="bg2">
+                          <a:lumMod val="40000"/>
+                          <a:lumOff val="60000"/>
+                        </a:schemeClr>
+                      </a:solidFill>
+                      <a:prstDash val="solid"/>
+                      <a:round/>
+                      <a:headEnd type="none" w="med" len="med"/>
+                      <a:tailEnd type="none" w="med" len="med"/>
+                    </a:lnR>
+                    <a:lnT w="12700" cap="flat" cmpd="sng" algn="ctr">
+                      <a:solidFill>
+                        <a:schemeClr val="bg2">
+                          <a:lumMod val="40000"/>
+                          <a:lumOff val="60000"/>
+                        </a:schemeClr>
+                      </a:solidFill>
+                      <a:prstDash val="solid"/>
+                      <a:round/>
+                      <a:headEnd type="none" w="med" len="med"/>
+                      <a:tailEnd type="none" w="med" len="med"/>
+                    </a:lnT>
+                    <a:lnB w="12700" cap="flat" cmpd="sng" algn="ctr">
+                      <a:solidFill>
+                        <a:schemeClr val="bg2">
+                          <a:lumMod val="40000"/>
+                          <a:lumOff val="60000"/>
+                        </a:schemeClr>
+                      </a:solidFill>
+                      <a:prstDash val="solid"/>
+                      <a:round/>
+                      <a:headEnd type="none" w="med" len="med"/>
+                      <a:tailEnd type="none" w="med" len="med"/>
+                    </a:lnB>
+                    <a:lnTlToBr w="12700" cmpd="sng">
+                      <a:noFill/>
+                      <a:prstDash val="solid"/>
+                    </a:lnTlToBr>
+                    <a:lnBlToTr w="12700" cmpd="sng">
+                      <a:noFill/>
+                      <a:prstDash val="solid"/>
+                    </a:lnBlToTr>
+                    <a:noFill/>
+                  </a:tcPr>
+                </a:tc>
+                <a:tc>
+                  <a:txBody>
+                    <a:bodyPr/>
+                    <a:lstStyle/>
+                    <a:p>
+                      <a:pPr algn="ctr">
+                        <a:buNone/>
+                      </a:pPr>
+                      <a:r>
+                        <a:rPr lang="en-US" sz="1300">
+                          <a:effectLst/>
+                          <a:latin typeface="Fira Sans" panose="020B0503050000020004" pitchFamily="34" charset="0"/>
+                        </a:rPr>
+                        <a:t>0.63</a:t>
+                      </a:r>
+                    </a:p>
+                  </a:txBody>
+                  <a:tcPr anchor="ctr">
+                    <a:lnL w="12700" cap="flat" cmpd="sng" algn="ctr">
+                      <a:solidFill>
+                        <a:schemeClr val="bg2">
+                          <a:lumMod val="40000"/>
+                          <a:lumOff val="60000"/>
+                        </a:schemeClr>
+                      </a:solidFill>
+                      <a:prstDash val="solid"/>
+                      <a:round/>
+                      <a:headEnd type="none" w="med" len="med"/>
+                      <a:tailEnd type="none" w="med" len="med"/>
+                    </a:lnL>
+                    <a:lnR w="12700" cap="flat" cmpd="sng" algn="ctr">
+                      <a:solidFill>
+                        <a:schemeClr val="bg2">
+                          <a:lumMod val="40000"/>
+                          <a:lumOff val="60000"/>
+                        </a:schemeClr>
+                      </a:solidFill>
+                      <a:prstDash val="solid"/>
+                      <a:round/>
+                      <a:headEnd type="none" w="med" len="med"/>
+                      <a:tailEnd type="none" w="med" len="med"/>
+                    </a:lnR>
+                    <a:lnT w="12700" cap="flat" cmpd="sng" algn="ctr">
+                      <a:solidFill>
+                        <a:schemeClr val="bg2">
+                          <a:lumMod val="40000"/>
+                          <a:lumOff val="60000"/>
+                        </a:schemeClr>
+                      </a:solidFill>
+                      <a:prstDash val="solid"/>
+                      <a:round/>
+                      <a:headEnd type="none" w="med" len="med"/>
+                      <a:tailEnd type="none" w="med" len="med"/>
+                    </a:lnT>
+                    <a:lnB w="12700" cap="flat" cmpd="sng" algn="ctr">
+                      <a:solidFill>
+                        <a:schemeClr val="bg2">
+                          <a:lumMod val="40000"/>
+                          <a:lumOff val="60000"/>
+                        </a:schemeClr>
+                      </a:solidFill>
+                      <a:prstDash val="solid"/>
+                      <a:round/>
+                      <a:headEnd type="none" w="med" len="med"/>
+                      <a:tailEnd type="none" w="med" len="med"/>
+                    </a:lnB>
+                    <a:lnTlToBr w="12700" cmpd="sng">
+                      <a:noFill/>
+                      <a:prstDash val="solid"/>
+                    </a:lnTlToBr>
+                    <a:lnBlToTr w="12700" cmpd="sng">
+                      <a:noFill/>
+                      <a:prstDash val="solid"/>
+                    </a:lnBlToTr>
+                    <a:noFill/>
+                  </a:tcPr>
+                </a:tc>
+                <a:tc>
+                  <a:txBody>
+                    <a:bodyPr/>
+                    <a:lstStyle/>
+                    <a:p>
+                      <a:pPr algn="ctr">
+                        <a:buNone/>
+                      </a:pPr>
+                      <a:r>
+                        <a:rPr lang="en-US" sz="1300" dirty="0">
+                          <a:effectLst/>
+                          <a:latin typeface="Fira Sans" panose="020B0503050000020004" pitchFamily="34" charset="0"/>
+                        </a:rPr>
+                        <a:t>HSE West and North West</a:t>
+                      </a:r>
+                    </a:p>
+                  </a:txBody>
+                  <a:tcPr anchor="ctr">
+                    <a:lnL w="12700" cap="flat" cmpd="sng" algn="ctr">
+                      <a:solidFill>
+                        <a:schemeClr val="bg2">
+                          <a:lumMod val="40000"/>
+                          <a:lumOff val="60000"/>
+                        </a:schemeClr>
+                      </a:solidFill>
+                      <a:prstDash val="solid"/>
+                      <a:round/>
+                      <a:headEnd type="none" w="med" len="med"/>
+                      <a:tailEnd type="none" w="med" len="med"/>
+                    </a:lnL>
+                    <a:lnR w="12700" cap="flat" cmpd="sng" algn="ctr">
+                      <a:solidFill>
+                        <a:schemeClr val="bg2">
+                          <a:lumMod val="40000"/>
+                          <a:lumOff val="60000"/>
+                        </a:schemeClr>
+                      </a:solidFill>
+                      <a:prstDash val="solid"/>
+                      <a:round/>
+                      <a:headEnd type="none" w="med" len="med"/>
+                      <a:tailEnd type="none" w="med" len="med"/>
+                    </a:lnR>
+                    <a:lnT w="12700" cap="flat" cmpd="sng" algn="ctr">
+                      <a:solidFill>
+                        <a:schemeClr val="bg2">
+                          <a:lumMod val="40000"/>
+                          <a:lumOff val="60000"/>
+                        </a:schemeClr>
+                      </a:solidFill>
+                      <a:prstDash val="solid"/>
+                      <a:round/>
+                      <a:headEnd type="none" w="med" len="med"/>
+                      <a:tailEnd type="none" w="med" len="med"/>
+                    </a:lnT>
+                    <a:lnB w="12700" cap="flat" cmpd="sng" algn="ctr">
+                      <a:solidFill>
+                        <a:schemeClr val="bg2">
+                          <a:lumMod val="40000"/>
+                          <a:lumOff val="60000"/>
+                        </a:schemeClr>
+                      </a:solidFill>
+                      <a:prstDash val="solid"/>
+                      <a:round/>
+                      <a:headEnd type="none" w="med" len="med"/>
+                      <a:tailEnd type="none" w="med" len="med"/>
+                    </a:lnB>
+                    <a:lnTlToBr w="12700" cmpd="sng">
+                      <a:noFill/>
+                      <a:prstDash val="solid"/>
+                    </a:lnTlToBr>
+                    <a:lnBlToTr w="12700" cmpd="sng">
+                      <a:noFill/>
+                      <a:prstDash val="solid"/>
+                    </a:lnBlToTr>
+                    <a:noFill/>
+                  </a:tcPr>
+                </a:tc>
+                <a:extLst>
+                  <a:ext uri="{0D108BD9-81ED-4DB2-BD59-A6C34878D82A}">
+                    <a16:rowId xmlns:a16="http://schemas.microsoft.com/office/drawing/2014/main" val="3291572506"/>
+                  </a:ext>
+                </a:extLst>
+              </a:tr>
+              <a:tr h="288014">
+                <a:tc>
+                  <a:txBody>
+                    <a:bodyPr/>
+                    <a:lstStyle/>
+                    <a:p>
+                      <a:pPr algn="ctr">
+                        <a:buNone/>
+                      </a:pPr>
+                      <a:r>
+                        <a:rPr lang="en-US" sz="1300" dirty="0">
+                          <a:effectLst/>
+                          <a:latin typeface="Fira Sans" panose="020B0503050000020004" pitchFamily="34" charset="0"/>
+                        </a:rPr>
+                        <a:t>0.70</a:t>
+                      </a:r>
+                    </a:p>
+                  </a:txBody>
+                  <a:tcPr anchor="ctr">
+                    <a:lnL w="12700" cap="flat" cmpd="sng" algn="ctr">
+                      <a:solidFill>
+                        <a:schemeClr val="bg2">
+                          <a:lumMod val="40000"/>
+                          <a:lumOff val="60000"/>
+                        </a:schemeClr>
+                      </a:solidFill>
+                      <a:prstDash val="solid"/>
+                      <a:round/>
+                      <a:headEnd type="none" w="med" len="med"/>
+                      <a:tailEnd type="none" w="med" len="med"/>
+                    </a:lnL>
+                    <a:lnR w="12700" cap="flat" cmpd="sng" algn="ctr">
+                      <a:solidFill>
+                        <a:schemeClr val="bg2">
+                          <a:lumMod val="40000"/>
+                          <a:lumOff val="60000"/>
+                        </a:schemeClr>
+                      </a:solidFill>
+                      <a:prstDash val="solid"/>
+                      <a:round/>
+                      <a:headEnd type="none" w="med" len="med"/>
+                      <a:tailEnd type="none" w="med" len="med"/>
+                    </a:lnR>
+                    <a:lnT w="12700" cap="flat" cmpd="sng" algn="ctr">
+                      <a:solidFill>
+                        <a:schemeClr val="bg2">
+                          <a:lumMod val="40000"/>
+                          <a:lumOff val="60000"/>
+                        </a:schemeClr>
+                      </a:solidFill>
+                      <a:prstDash val="solid"/>
+                      <a:round/>
+                      <a:headEnd type="none" w="med" len="med"/>
+                      <a:tailEnd type="none" w="med" len="med"/>
+                    </a:lnT>
+                    <a:lnB w="12700" cap="flat" cmpd="sng" algn="ctr">
+                      <a:solidFill>
+                        <a:schemeClr val="tx1"/>
+                      </a:solidFill>
+                      <a:prstDash val="solid"/>
+                      <a:round/>
+                      <a:headEnd type="none" w="med" len="med"/>
+                      <a:tailEnd type="none" w="med" len="med"/>
+                    </a:lnB>
+                    <a:lnTlToBr w="12700" cmpd="sng">
+                      <a:noFill/>
+                      <a:prstDash val="solid"/>
+                    </a:lnTlToBr>
+                    <a:lnBlToTr w="12700" cmpd="sng">
+                      <a:noFill/>
+                      <a:prstDash val="solid"/>
+                    </a:lnBlToTr>
+                    <a:noFill/>
+                  </a:tcPr>
+                </a:tc>
+                <a:tc>
+                  <a:txBody>
+                    <a:bodyPr/>
+                    <a:lstStyle/>
+                    <a:p>
+                      <a:pPr algn="ctr">
+                        <a:buNone/>
+                      </a:pPr>
+                      <a:r>
+                        <a:rPr lang="en-US" sz="1300" dirty="0">
+                          <a:effectLst/>
+                          <a:latin typeface="Fira Sans" panose="020B0503050000020004" pitchFamily="34" charset="0"/>
+                        </a:rPr>
+                        <a:t>0.55</a:t>
+                      </a:r>
+                    </a:p>
+                  </a:txBody>
+                  <a:tcPr anchor="ctr">
+                    <a:lnL w="12700" cap="flat" cmpd="sng" algn="ctr">
+                      <a:solidFill>
+                        <a:schemeClr val="bg2">
+                          <a:lumMod val="40000"/>
+                          <a:lumOff val="60000"/>
+                        </a:schemeClr>
+                      </a:solidFill>
+                      <a:prstDash val="solid"/>
+                      <a:round/>
+                      <a:headEnd type="none" w="med" len="med"/>
+                      <a:tailEnd type="none" w="med" len="med"/>
+                    </a:lnL>
+                    <a:lnR w="12700" cap="flat" cmpd="sng" algn="ctr">
+                      <a:solidFill>
+                        <a:schemeClr val="bg2">
+                          <a:lumMod val="40000"/>
+                          <a:lumOff val="60000"/>
+                        </a:schemeClr>
+                      </a:solidFill>
+                      <a:prstDash val="solid"/>
+                      <a:round/>
+                      <a:headEnd type="none" w="med" len="med"/>
+                      <a:tailEnd type="none" w="med" len="med"/>
+                    </a:lnR>
+                    <a:lnT w="12700" cap="flat" cmpd="sng" algn="ctr">
+                      <a:solidFill>
+                        <a:schemeClr val="bg2">
+                          <a:lumMod val="40000"/>
+                          <a:lumOff val="60000"/>
+                        </a:schemeClr>
+                      </a:solidFill>
+                      <a:prstDash val="solid"/>
+                      <a:round/>
+                      <a:headEnd type="none" w="med" len="med"/>
+                      <a:tailEnd type="none" w="med" len="med"/>
+                    </a:lnT>
+                    <a:lnB w="12700" cap="flat" cmpd="sng" algn="ctr">
+                      <a:solidFill>
+                        <a:schemeClr val="tx1"/>
+                      </a:solidFill>
+                      <a:prstDash val="solid"/>
+                      <a:round/>
+                      <a:headEnd type="none" w="med" len="med"/>
+                      <a:tailEnd type="none" w="med" len="med"/>
+                    </a:lnB>
+                    <a:lnTlToBr w="12700" cmpd="sng">
+                      <a:noFill/>
+                      <a:prstDash val="solid"/>
+                    </a:lnTlToBr>
+                    <a:lnBlToTr w="12700" cmpd="sng">
+                      <a:noFill/>
+                      <a:prstDash val="solid"/>
+                    </a:lnBlToTr>
+                    <a:noFill/>
+                  </a:tcPr>
+                </a:tc>
+                <a:tc>
+                  <a:txBody>
+                    <a:bodyPr/>
+                    <a:lstStyle/>
+                    <a:p>
+                      <a:pPr algn="ctr">
+                        <a:buNone/>
+                      </a:pPr>
+                      <a:r>
+                        <a:rPr lang="en-US" sz="1300" dirty="0">
+                          <a:effectLst/>
+                          <a:latin typeface="Fira Sans" panose="020B0503050000020004" pitchFamily="34" charset="0"/>
+                        </a:rPr>
+                        <a:t>0.87</a:t>
+                      </a:r>
+                    </a:p>
+                  </a:txBody>
+                  <a:tcPr anchor="ctr">
+                    <a:lnL w="12700" cap="flat" cmpd="sng" algn="ctr">
+                      <a:solidFill>
+                        <a:schemeClr val="bg2">
+                          <a:lumMod val="40000"/>
+                          <a:lumOff val="60000"/>
+                        </a:schemeClr>
+                      </a:solidFill>
+                      <a:prstDash val="solid"/>
+                      <a:round/>
+                      <a:headEnd type="none" w="med" len="med"/>
+                      <a:tailEnd type="none" w="med" len="med"/>
+                    </a:lnL>
+                    <a:lnR w="12700" cap="flat" cmpd="sng" algn="ctr">
+                      <a:solidFill>
+                        <a:schemeClr val="bg2">
+                          <a:lumMod val="40000"/>
+                          <a:lumOff val="60000"/>
+                        </a:schemeClr>
+                      </a:solidFill>
+                      <a:prstDash val="solid"/>
+                      <a:round/>
+                      <a:headEnd type="none" w="med" len="med"/>
+                      <a:tailEnd type="none" w="med" len="med"/>
+                    </a:lnR>
+                    <a:lnT w="12700" cap="flat" cmpd="sng" algn="ctr">
+                      <a:solidFill>
+                        <a:schemeClr val="bg2">
+                          <a:lumMod val="40000"/>
+                          <a:lumOff val="60000"/>
+                        </a:schemeClr>
+                      </a:solidFill>
+                      <a:prstDash val="solid"/>
+                      <a:round/>
+                      <a:headEnd type="none" w="med" len="med"/>
+                      <a:tailEnd type="none" w="med" len="med"/>
+                    </a:lnT>
+                    <a:lnB w="12700" cap="flat" cmpd="sng" algn="ctr">
+                      <a:solidFill>
+                        <a:schemeClr val="tx1"/>
+                      </a:solidFill>
+                      <a:prstDash val="solid"/>
+                      <a:round/>
+                      <a:headEnd type="none" w="med" len="med"/>
+                      <a:tailEnd type="none" w="med" len="med"/>
+                    </a:lnB>
+                    <a:lnTlToBr w="12700" cmpd="sng">
+                      <a:noFill/>
+                      <a:prstDash val="solid"/>
+                    </a:lnTlToBr>
+                    <a:lnBlToTr w="12700" cmpd="sng">
+                      <a:noFill/>
+                      <a:prstDash val="solid"/>
+                    </a:lnBlToTr>
+                    <a:noFill/>
+                  </a:tcPr>
+                </a:tc>
+                <a:tc>
+                  <a:txBody>
+                    <a:bodyPr/>
+                    <a:lstStyle/>
+                    <a:p>
+                      <a:pPr algn="ctr">
+                        <a:buNone/>
+                      </a:pPr>
+                      <a:r>
+                        <a:rPr lang="en-US" sz="1300" dirty="0">
+                          <a:effectLst/>
+                          <a:latin typeface="Fira Sans" panose="020B0503050000020004" pitchFamily="34" charset="0"/>
+                        </a:rPr>
+                        <a:t>HSE South West</a:t>
+                      </a:r>
+                    </a:p>
+                  </a:txBody>
+                  <a:tcPr anchor="ctr">
+                    <a:lnL w="12700" cap="flat" cmpd="sng" algn="ctr">
+                      <a:solidFill>
+                        <a:schemeClr val="bg2">
+                          <a:lumMod val="40000"/>
+                          <a:lumOff val="60000"/>
+                        </a:schemeClr>
+                      </a:solidFill>
+                      <a:prstDash val="solid"/>
+                      <a:round/>
+                      <a:headEnd type="none" w="med" len="med"/>
+                      <a:tailEnd type="none" w="med" len="med"/>
+                    </a:lnL>
+                    <a:lnR w="12700" cap="flat" cmpd="sng" algn="ctr">
+                      <a:solidFill>
+                        <a:schemeClr val="bg2">
+                          <a:lumMod val="40000"/>
+                          <a:lumOff val="60000"/>
+                        </a:schemeClr>
+                      </a:solidFill>
+                      <a:prstDash val="solid"/>
+                      <a:round/>
+                      <a:headEnd type="none" w="med" len="med"/>
+                      <a:tailEnd type="none" w="med" len="med"/>
+                    </a:lnR>
+                    <a:lnT w="12700" cap="flat" cmpd="sng" algn="ctr">
+                      <a:solidFill>
+                        <a:schemeClr val="bg2">
+                          <a:lumMod val="40000"/>
+                          <a:lumOff val="60000"/>
+                        </a:schemeClr>
+                      </a:solidFill>
+                      <a:prstDash val="solid"/>
+                      <a:round/>
+                      <a:headEnd type="none" w="med" len="med"/>
+                      <a:tailEnd type="none" w="med" len="med"/>
+                    </a:lnT>
+                    <a:lnB w="12700" cap="flat" cmpd="sng" algn="ctr">
+                      <a:solidFill>
+                        <a:schemeClr val="tx1"/>
+                      </a:solidFill>
+                      <a:prstDash val="solid"/>
+                      <a:round/>
+                      <a:headEnd type="none" w="med" len="med"/>
+                      <a:tailEnd type="none" w="med" len="med"/>
+                    </a:lnB>
+                    <a:lnTlToBr w="12700" cmpd="sng">
+                      <a:noFill/>
+                      <a:prstDash val="solid"/>
+                    </a:lnTlToBr>
+                    <a:lnBlToTr w="12700" cmpd="sng">
+                      <a:noFill/>
+                      <a:prstDash val="solid"/>
+                    </a:lnBlToTr>
+                    <a:noFill/>
+                  </a:tcPr>
+                </a:tc>
+                <a:extLst>
+                  <a:ext uri="{0D108BD9-81ED-4DB2-BD59-A6C34878D82A}">
+                    <a16:rowId xmlns:a16="http://schemas.microsoft.com/office/drawing/2014/main" val="1116715039"/>
+                  </a:ext>
+                </a:extLst>
+              </a:tr>
+              <a:tr h="288014">
+                <a:tc>
+                  <a:txBody>
+                    <a:bodyPr/>
+                    <a:lstStyle/>
+                    <a:p>
+                      <a:pPr algn="ctr">
+                        <a:buNone/>
+                      </a:pPr>
+                      <a:r>
+                        <a:rPr lang="en-US" sz="1300">
+                          <a:effectLst/>
+                          <a:latin typeface="Fira Sans" panose="020B0503050000020004" pitchFamily="34" charset="0"/>
+                        </a:rPr>
+                        <a:t>1.01</a:t>
+                      </a:r>
+                    </a:p>
+                  </a:txBody>
+                  <a:tcPr anchor="ctr">
+                    <a:lnL w="12700" cap="flat" cmpd="sng" algn="ctr">
+                      <a:solidFill>
+                        <a:schemeClr val="bg2">
+                          <a:lumMod val="40000"/>
+                          <a:lumOff val="60000"/>
+                        </a:schemeClr>
+                      </a:solidFill>
+                      <a:prstDash val="solid"/>
+                      <a:round/>
+                      <a:headEnd type="none" w="med" len="med"/>
+                      <a:tailEnd type="none" w="med" len="med"/>
+                    </a:lnL>
+                    <a:lnR w="12700" cap="flat" cmpd="sng" algn="ctr">
+                      <a:solidFill>
+                        <a:schemeClr val="bg2">
+                          <a:lumMod val="40000"/>
+                          <a:lumOff val="60000"/>
+                        </a:schemeClr>
+                      </a:solidFill>
+                      <a:prstDash val="solid"/>
+                      <a:round/>
+                      <a:headEnd type="none" w="med" len="med"/>
+                      <a:tailEnd type="none" w="med" len="med"/>
+                    </a:lnR>
+                    <a:lnT w="12700" cap="flat" cmpd="sng" algn="ctr">
+                      <a:solidFill>
+                        <a:schemeClr val="tx1"/>
+                      </a:solidFill>
+                      <a:prstDash val="solid"/>
+                      <a:round/>
+                      <a:headEnd type="none" w="med" len="med"/>
+                      <a:tailEnd type="none" w="med" len="med"/>
+                    </a:lnT>
+                    <a:lnB w="12700" cap="flat" cmpd="sng" algn="ctr">
+                      <a:solidFill>
+                        <a:schemeClr val="bg2">
+                          <a:lumMod val="40000"/>
+                          <a:lumOff val="60000"/>
+                        </a:schemeClr>
+                      </a:solidFill>
+                      <a:prstDash val="solid"/>
+                      <a:round/>
+                      <a:headEnd type="none" w="med" len="med"/>
+                      <a:tailEnd type="none" w="med" len="med"/>
+                    </a:lnB>
+                    <a:lnTlToBr w="12700" cmpd="sng">
+                      <a:noFill/>
+                      <a:prstDash val="solid"/>
+                    </a:lnTlToBr>
+                    <a:lnBlToTr w="12700" cmpd="sng">
+                      <a:noFill/>
+                      <a:prstDash val="solid"/>
+                    </a:lnBlToTr>
+                    <a:noFill/>
+                  </a:tcPr>
+                </a:tc>
+                <a:tc>
+                  <a:txBody>
+                    <a:bodyPr/>
+                    <a:lstStyle/>
+                    <a:p>
+                      <a:pPr algn="ctr">
+                        <a:buNone/>
+                      </a:pPr>
+                      <a:r>
+                        <a:rPr lang="en-US" sz="1300">
+                          <a:effectLst/>
+                          <a:latin typeface="Fira Sans" panose="020B0503050000020004" pitchFamily="34" charset="0"/>
+                        </a:rPr>
+                        <a:t>0.79</a:t>
+                      </a:r>
+                    </a:p>
+                  </a:txBody>
+                  <a:tcPr anchor="ctr">
+                    <a:lnL w="12700" cap="flat" cmpd="sng" algn="ctr">
+                      <a:solidFill>
+                        <a:schemeClr val="bg2">
+                          <a:lumMod val="40000"/>
+                          <a:lumOff val="60000"/>
+                        </a:schemeClr>
+                      </a:solidFill>
+                      <a:prstDash val="solid"/>
+                      <a:round/>
+                      <a:headEnd type="none" w="med" len="med"/>
+                      <a:tailEnd type="none" w="med" len="med"/>
+                    </a:lnL>
+                    <a:lnR w="12700" cap="flat" cmpd="sng" algn="ctr">
+                      <a:solidFill>
+                        <a:schemeClr val="bg2">
+                          <a:lumMod val="40000"/>
+                          <a:lumOff val="60000"/>
+                        </a:schemeClr>
+                      </a:solidFill>
+                      <a:prstDash val="solid"/>
+                      <a:round/>
+                      <a:headEnd type="none" w="med" len="med"/>
+                      <a:tailEnd type="none" w="med" len="med"/>
+                    </a:lnR>
+                    <a:lnT w="12700" cap="flat" cmpd="sng" algn="ctr">
+                      <a:solidFill>
+                        <a:schemeClr val="tx1"/>
+                      </a:solidFill>
+                      <a:prstDash val="solid"/>
+                      <a:round/>
+                      <a:headEnd type="none" w="med" len="med"/>
+                      <a:tailEnd type="none" w="med" len="med"/>
+                    </a:lnT>
+                    <a:lnB w="12700" cap="flat" cmpd="sng" algn="ctr">
+                      <a:solidFill>
+                        <a:schemeClr val="bg2">
+                          <a:lumMod val="40000"/>
+                          <a:lumOff val="60000"/>
+                        </a:schemeClr>
+                      </a:solidFill>
+                      <a:prstDash val="solid"/>
+                      <a:round/>
+                      <a:headEnd type="none" w="med" len="med"/>
+                      <a:tailEnd type="none" w="med" len="med"/>
+                    </a:lnB>
+                    <a:lnTlToBr w="12700" cmpd="sng">
+                      <a:noFill/>
+                      <a:prstDash val="solid"/>
+                    </a:lnTlToBr>
+                    <a:lnBlToTr w="12700" cmpd="sng">
+                      <a:noFill/>
+                      <a:prstDash val="solid"/>
+                    </a:lnBlToTr>
+                    <a:noFill/>
+                  </a:tcPr>
+                </a:tc>
+                <a:tc>
+                  <a:txBody>
+                    <a:bodyPr/>
+                    <a:lstStyle/>
+                    <a:p>
+                      <a:pPr algn="ctr">
+                        <a:buNone/>
+                      </a:pPr>
+                      <a:r>
+                        <a:rPr lang="en-US" sz="1300" dirty="0">
+                          <a:effectLst/>
+                          <a:latin typeface="Fira Sans" panose="020B0503050000020004" pitchFamily="34" charset="0"/>
+                        </a:rPr>
+                        <a:t>1.26</a:t>
+                      </a:r>
+                    </a:p>
+                  </a:txBody>
+                  <a:tcPr anchor="ctr">
+                    <a:lnL w="12700" cap="flat" cmpd="sng" algn="ctr">
+                      <a:solidFill>
+                        <a:schemeClr val="bg2">
+                          <a:lumMod val="40000"/>
+                          <a:lumOff val="60000"/>
+                        </a:schemeClr>
+                      </a:solidFill>
+                      <a:prstDash val="solid"/>
+                      <a:round/>
+                      <a:headEnd type="none" w="med" len="med"/>
+                      <a:tailEnd type="none" w="med" len="med"/>
+                    </a:lnL>
+                    <a:lnR w="12700" cap="flat" cmpd="sng" algn="ctr">
+                      <a:solidFill>
+                        <a:schemeClr val="bg2">
+                          <a:lumMod val="40000"/>
+                          <a:lumOff val="60000"/>
+                        </a:schemeClr>
+                      </a:solidFill>
+                      <a:prstDash val="solid"/>
+                      <a:round/>
+                      <a:headEnd type="none" w="med" len="med"/>
+                      <a:tailEnd type="none" w="med" len="med"/>
+                    </a:lnR>
+                    <a:lnT w="12700" cap="flat" cmpd="sng" algn="ctr">
+                      <a:solidFill>
+                        <a:schemeClr val="tx1"/>
+                      </a:solidFill>
+                      <a:prstDash val="solid"/>
+                      <a:round/>
+                      <a:headEnd type="none" w="med" len="med"/>
+                      <a:tailEnd type="none" w="med" len="med"/>
+                    </a:lnT>
+                    <a:lnB w="12700" cap="flat" cmpd="sng" algn="ctr">
+                      <a:solidFill>
+                        <a:schemeClr val="bg2">
+                          <a:lumMod val="40000"/>
+                          <a:lumOff val="60000"/>
+                        </a:schemeClr>
+                      </a:solidFill>
+                      <a:prstDash val="solid"/>
+                      <a:round/>
+                      <a:headEnd type="none" w="med" len="med"/>
+                      <a:tailEnd type="none" w="med" len="med"/>
+                    </a:lnB>
+                    <a:lnTlToBr w="12700" cmpd="sng">
+                      <a:noFill/>
+                      <a:prstDash val="solid"/>
+                    </a:lnTlToBr>
+                    <a:lnBlToTr w="12700" cmpd="sng">
+                      <a:noFill/>
+                      <a:prstDash val="solid"/>
+                    </a:lnBlToTr>
+                    <a:noFill/>
+                  </a:tcPr>
+                </a:tc>
+                <a:tc>
+                  <a:txBody>
+                    <a:bodyPr/>
+                    <a:lstStyle/>
+                    <a:p>
+                      <a:pPr algn="ctr">
+                        <a:buNone/>
+                      </a:pPr>
+                      <a:r>
+                        <a:rPr lang="en-US" sz="1300" dirty="0">
+                          <a:effectLst/>
+                          <a:latin typeface="Fira Sans" panose="020B0503050000020004" pitchFamily="34" charset="0"/>
+                        </a:rPr>
+                        <a:t>HSE Dublin and Midlands</a:t>
+                      </a:r>
+                    </a:p>
+                  </a:txBody>
+                  <a:tcPr anchor="ctr">
+                    <a:lnL w="12700" cap="flat" cmpd="sng" algn="ctr">
+                      <a:solidFill>
+                        <a:schemeClr val="bg2">
+                          <a:lumMod val="40000"/>
+                          <a:lumOff val="60000"/>
+                        </a:schemeClr>
+                      </a:solidFill>
+                      <a:prstDash val="solid"/>
+                      <a:round/>
+                      <a:headEnd type="none" w="med" len="med"/>
+                      <a:tailEnd type="none" w="med" len="med"/>
+                    </a:lnL>
+                    <a:lnR w="12700" cap="flat" cmpd="sng" algn="ctr">
+                      <a:solidFill>
+                        <a:schemeClr val="bg2">
+                          <a:lumMod val="40000"/>
+                          <a:lumOff val="60000"/>
+                        </a:schemeClr>
+                      </a:solidFill>
+                      <a:prstDash val="solid"/>
+                      <a:round/>
+                      <a:headEnd type="none" w="med" len="med"/>
+                      <a:tailEnd type="none" w="med" len="med"/>
+                    </a:lnR>
+                    <a:lnT w="12700" cap="flat" cmpd="sng" algn="ctr">
+                      <a:solidFill>
+                        <a:schemeClr val="tx1"/>
+                      </a:solidFill>
+                      <a:prstDash val="solid"/>
+                      <a:round/>
+                      <a:headEnd type="none" w="med" len="med"/>
+                      <a:tailEnd type="none" w="med" len="med"/>
+                    </a:lnT>
+                    <a:lnB w="12700" cap="flat" cmpd="sng" algn="ctr">
+                      <a:solidFill>
+                        <a:schemeClr val="bg2">
+                          <a:lumMod val="40000"/>
+                          <a:lumOff val="60000"/>
+                        </a:schemeClr>
+                      </a:solidFill>
+                      <a:prstDash val="solid"/>
+                      <a:round/>
+                      <a:headEnd type="none" w="med" len="med"/>
+                      <a:tailEnd type="none" w="med" len="med"/>
+                    </a:lnB>
+                    <a:lnTlToBr w="12700" cmpd="sng">
+                      <a:noFill/>
+                      <a:prstDash val="solid"/>
+                    </a:lnTlToBr>
+                    <a:lnBlToTr w="12700" cmpd="sng">
+                      <a:noFill/>
+                      <a:prstDash val="solid"/>
+                    </a:lnBlToTr>
+                    <a:noFill/>
+                  </a:tcPr>
+                </a:tc>
+                <a:extLst>
+                  <a:ext uri="{0D108BD9-81ED-4DB2-BD59-A6C34878D82A}">
+                    <a16:rowId xmlns:a16="http://schemas.microsoft.com/office/drawing/2014/main" val="3003515535"/>
+                  </a:ext>
+                </a:extLst>
+              </a:tr>
+              <a:tr h="288014">
+                <a:tc>
+                  <a:txBody>
+                    <a:bodyPr/>
+                    <a:lstStyle/>
+                    <a:p>
+                      <a:pPr algn="ctr">
+                        <a:buNone/>
+                      </a:pPr>
+                      <a:r>
+                        <a:rPr lang="en-US" sz="1300">
+                          <a:effectLst/>
+                          <a:latin typeface="Fira Sans" panose="020B0503050000020004" pitchFamily="34" charset="0"/>
+                        </a:rPr>
+                        <a:t>1.85</a:t>
+                      </a:r>
+                    </a:p>
+                  </a:txBody>
+                  <a:tcPr anchor="ctr">
+                    <a:lnL w="12700" cap="flat" cmpd="sng" algn="ctr">
+                      <a:solidFill>
+                        <a:schemeClr val="bg2">
+                          <a:lumMod val="40000"/>
+                          <a:lumOff val="60000"/>
+                        </a:schemeClr>
+                      </a:solidFill>
+                      <a:prstDash val="solid"/>
+                      <a:round/>
+                      <a:headEnd type="none" w="med" len="med"/>
+                      <a:tailEnd type="none" w="med" len="med"/>
+                    </a:lnL>
+                    <a:lnR w="12700" cap="flat" cmpd="sng" algn="ctr">
+                      <a:solidFill>
+                        <a:schemeClr val="bg2">
+                          <a:lumMod val="40000"/>
+                          <a:lumOff val="60000"/>
+                        </a:schemeClr>
+                      </a:solidFill>
+                      <a:prstDash val="solid"/>
+                      <a:round/>
+                      <a:headEnd type="none" w="med" len="med"/>
+                      <a:tailEnd type="none" w="med" len="med"/>
+                    </a:lnR>
+                    <a:lnT w="12700" cap="flat" cmpd="sng" algn="ctr">
+                      <a:solidFill>
+                        <a:schemeClr val="bg2">
+                          <a:lumMod val="40000"/>
+                          <a:lumOff val="60000"/>
+                        </a:schemeClr>
+                      </a:solidFill>
+                      <a:prstDash val="solid"/>
+                      <a:round/>
+                      <a:headEnd type="none" w="med" len="med"/>
+                      <a:tailEnd type="none" w="med" len="med"/>
+                    </a:lnT>
+                    <a:lnB w="12700" cap="flat" cmpd="sng" algn="ctr">
+                      <a:solidFill>
+                        <a:schemeClr val="bg2">
+                          <a:lumMod val="40000"/>
+                          <a:lumOff val="60000"/>
+                        </a:schemeClr>
+                      </a:solidFill>
+                      <a:prstDash val="solid"/>
+                      <a:round/>
+                      <a:headEnd type="none" w="med" len="med"/>
+                      <a:tailEnd type="none" w="med" len="med"/>
+                    </a:lnB>
+                    <a:lnTlToBr w="12700" cmpd="sng">
+                      <a:noFill/>
+                      <a:prstDash val="solid"/>
+                    </a:lnTlToBr>
+                    <a:lnBlToTr w="12700" cmpd="sng">
+                      <a:noFill/>
+                      <a:prstDash val="solid"/>
+                    </a:lnBlToTr>
+                    <a:noFill/>
+                  </a:tcPr>
+                </a:tc>
+                <a:tc>
+                  <a:txBody>
+                    <a:bodyPr/>
+                    <a:lstStyle/>
+                    <a:p>
+                      <a:pPr algn="ctr">
+                        <a:buNone/>
+                      </a:pPr>
+                      <a:r>
+                        <a:rPr lang="en-US" sz="1300">
+                          <a:effectLst/>
+                          <a:latin typeface="Fira Sans" panose="020B0503050000020004" pitchFamily="34" charset="0"/>
+                        </a:rPr>
+                        <a:t>1.45</a:t>
+                      </a:r>
+                    </a:p>
+                  </a:txBody>
+                  <a:tcPr anchor="ctr">
+                    <a:lnL w="12700" cap="flat" cmpd="sng" algn="ctr">
+                      <a:solidFill>
+                        <a:schemeClr val="bg2">
+                          <a:lumMod val="40000"/>
+                          <a:lumOff val="60000"/>
+                        </a:schemeClr>
+                      </a:solidFill>
+                      <a:prstDash val="solid"/>
+                      <a:round/>
+                      <a:headEnd type="none" w="med" len="med"/>
+                      <a:tailEnd type="none" w="med" len="med"/>
+                    </a:lnL>
+                    <a:lnR w="12700" cap="flat" cmpd="sng" algn="ctr">
+                      <a:solidFill>
+                        <a:schemeClr val="bg2">
+                          <a:lumMod val="40000"/>
+                          <a:lumOff val="60000"/>
+                        </a:schemeClr>
+                      </a:solidFill>
+                      <a:prstDash val="solid"/>
+                      <a:round/>
+                      <a:headEnd type="none" w="med" len="med"/>
+                      <a:tailEnd type="none" w="med" len="med"/>
+                    </a:lnR>
+                    <a:lnT w="12700" cap="flat" cmpd="sng" algn="ctr">
+                      <a:solidFill>
+                        <a:schemeClr val="bg2">
+                          <a:lumMod val="40000"/>
+                          <a:lumOff val="60000"/>
+                        </a:schemeClr>
+                      </a:solidFill>
+                      <a:prstDash val="solid"/>
+                      <a:round/>
+                      <a:headEnd type="none" w="med" len="med"/>
+                      <a:tailEnd type="none" w="med" len="med"/>
+                    </a:lnT>
+                    <a:lnB w="12700" cap="flat" cmpd="sng" algn="ctr">
+                      <a:solidFill>
+                        <a:schemeClr val="bg2">
+                          <a:lumMod val="40000"/>
+                          <a:lumOff val="60000"/>
+                        </a:schemeClr>
+                      </a:solidFill>
+                      <a:prstDash val="solid"/>
+                      <a:round/>
+                      <a:headEnd type="none" w="med" len="med"/>
+                      <a:tailEnd type="none" w="med" len="med"/>
+                    </a:lnB>
+                    <a:lnTlToBr w="12700" cmpd="sng">
+                      <a:noFill/>
+                      <a:prstDash val="solid"/>
+                    </a:lnTlToBr>
+                    <a:lnBlToTr w="12700" cmpd="sng">
+                      <a:noFill/>
+                      <a:prstDash val="solid"/>
+                    </a:lnBlToTr>
+                    <a:noFill/>
+                  </a:tcPr>
+                </a:tc>
+                <a:tc>
+                  <a:txBody>
+                    <a:bodyPr/>
+                    <a:lstStyle/>
+                    <a:p>
+                      <a:pPr algn="ctr">
+                        <a:buNone/>
+                      </a:pPr>
+                      <a:r>
+                        <a:rPr lang="en-US" sz="1300">
+                          <a:effectLst/>
+                          <a:latin typeface="Fira Sans" panose="020B0503050000020004" pitchFamily="34" charset="0"/>
+                        </a:rPr>
+                        <a:t>2.30</a:t>
+                      </a:r>
+                    </a:p>
+                  </a:txBody>
+                  <a:tcPr anchor="ctr">
+                    <a:lnL w="12700" cap="flat" cmpd="sng" algn="ctr">
+                      <a:solidFill>
+                        <a:schemeClr val="bg2">
+                          <a:lumMod val="40000"/>
+                          <a:lumOff val="60000"/>
+                        </a:schemeClr>
+                      </a:solidFill>
+                      <a:prstDash val="solid"/>
+                      <a:round/>
+                      <a:headEnd type="none" w="med" len="med"/>
+                      <a:tailEnd type="none" w="med" len="med"/>
+                    </a:lnL>
+                    <a:lnR w="12700" cap="flat" cmpd="sng" algn="ctr">
+                      <a:solidFill>
+                        <a:schemeClr val="bg2">
+                          <a:lumMod val="40000"/>
+                          <a:lumOff val="60000"/>
+                        </a:schemeClr>
+                      </a:solidFill>
+                      <a:prstDash val="solid"/>
+                      <a:round/>
+                      <a:headEnd type="none" w="med" len="med"/>
+                      <a:tailEnd type="none" w="med" len="med"/>
+                    </a:lnR>
+                    <a:lnT w="12700" cap="flat" cmpd="sng" algn="ctr">
+                      <a:solidFill>
+                        <a:schemeClr val="bg2">
+                          <a:lumMod val="40000"/>
+                          <a:lumOff val="60000"/>
+                        </a:schemeClr>
+                      </a:solidFill>
+                      <a:prstDash val="solid"/>
+                      <a:round/>
+                      <a:headEnd type="none" w="med" len="med"/>
+                      <a:tailEnd type="none" w="med" len="med"/>
+                    </a:lnT>
+                    <a:lnB w="12700" cap="flat" cmpd="sng" algn="ctr">
+                      <a:solidFill>
+                        <a:schemeClr val="bg2">
+                          <a:lumMod val="40000"/>
+                          <a:lumOff val="60000"/>
+                        </a:schemeClr>
+                      </a:solidFill>
+                      <a:prstDash val="solid"/>
+                      <a:round/>
+                      <a:headEnd type="none" w="med" len="med"/>
+                      <a:tailEnd type="none" w="med" len="med"/>
+                    </a:lnB>
+                    <a:lnTlToBr w="12700" cmpd="sng">
+                      <a:noFill/>
+                      <a:prstDash val="solid"/>
+                    </a:lnTlToBr>
+                    <a:lnBlToTr w="12700" cmpd="sng">
+                      <a:noFill/>
+                      <a:prstDash val="solid"/>
+                    </a:lnBlToTr>
+                    <a:noFill/>
+                  </a:tcPr>
+                </a:tc>
+                <a:tc>
+                  <a:txBody>
+                    <a:bodyPr/>
+                    <a:lstStyle/>
+                    <a:p>
+                      <a:pPr algn="ctr">
+                        <a:buNone/>
+                      </a:pPr>
+                      <a:r>
+                        <a:rPr lang="en-US" sz="1300">
+                          <a:effectLst/>
+                          <a:latin typeface="Fira Sans" panose="020B0503050000020004" pitchFamily="34" charset="0"/>
+                        </a:rPr>
+                        <a:t>HSE Dublin and South East</a:t>
+                      </a:r>
+                    </a:p>
+                  </a:txBody>
+                  <a:tcPr anchor="ctr">
+                    <a:lnL w="12700" cap="flat" cmpd="sng" algn="ctr">
+                      <a:solidFill>
+                        <a:schemeClr val="bg2">
+                          <a:lumMod val="40000"/>
+                          <a:lumOff val="60000"/>
+                        </a:schemeClr>
+                      </a:solidFill>
+                      <a:prstDash val="solid"/>
+                      <a:round/>
+                      <a:headEnd type="none" w="med" len="med"/>
+                      <a:tailEnd type="none" w="med" len="med"/>
+                    </a:lnL>
+                    <a:lnR w="12700" cap="flat" cmpd="sng" algn="ctr">
+                      <a:solidFill>
+                        <a:schemeClr val="bg2">
+                          <a:lumMod val="40000"/>
+                          <a:lumOff val="60000"/>
+                        </a:schemeClr>
+                      </a:solidFill>
+                      <a:prstDash val="solid"/>
+                      <a:round/>
+                      <a:headEnd type="none" w="med" len="med"/>
+                      <a:tailEnd type="none" w="med" len="med"/>
+                    </a:lnR>
+                    <a:lnT w="12700" cap="flat" cmpd="sng" algn="ctr">
+                      <a:solidFill>
+                        <a:schemeClr val="bg2">
+                          <a:lumMod val="40000"/>
+                          <a:lumOff val="60000"/>
+                        </a:schemeClr>
+                      </a:solidFill>
+                      <a:prstDash val="solid"/>
+                      <a:round/>
+                      <a:headEnd type="none" w="med" len="med"/>
+                      <a:tailEnd type="none" w="med" len="med"/>
+                    </a:lnT>
+                    <a:lnB w="12700" cap="flat" cmpd="sng" algn="ctr">
+                      <a:solidFill>
+                        <a:schemeClr val="bg2">
+                          <a:lumMod val="40000"/>
+                          <a:lumOff val="60000"/>
+                        </a:schemeClr>
+                      </a:solidFill>
+                      <a:prstDash val="solid"/>
+                      <a:round/>
+                      <a:headEnd type="none" w="med" len="med"/>
+                      <a:tailEnd type="none" w="med" len="med"/>
+                    </a:lnB>
+                    <a:lnTlToBr w="12700" cmpd="sng">
+                      <a:noFill/>
+                      <a:prstDash val="solid"/>
+                    </a:lnTlToBr>
+                    <a:lnBlToTr w="12700" cmpd="sng">
+                      <a:noFill/>
+                      <a:prstDash val="solid"/>
+                    </a:lnBlToTr>
+                    <a:noFill/>
+                  </a:tcPr>
+                </a:tc>
+                <a:extLst>
+                  <a:ext uri="{0D108BD9-81ED-4DB2-BD59-A6C34878D82A}">
+                    <a16:rowId xmlns:a16="http://schemas.microsoft.com/office/drawing/2014/main" val="3035608754"/>
+                  </a:ext>
+                </a:extLst>
+              </a:tr>
+              <a:tr h="288014">
+                <a:tc>
+                  <a:txBody>
+                    <a:bodyPr/>
+                    <a:lstStyle/>
+                    <a:p>
+                      <a:pPr algn="ctr">
+                        <a:buNone/>
+                      </a:pPr>
+                      <a:r>
+                        <a:rPr lang="en-US" sz="1300">
+                          <a:effectLst/>
+                          <a:latin typeface="Fira Sans" panose="020B0503050000020004" pitchFamily="34" charset="0"/>
+                        </a:rPr>
+                        <a:t>2.42</a:t>
+                      </a:r>
+                    </a:p>
+                  </a:txBody>
+                  <a:tcPr anchor="ctr">
+                    <a:lnL w="12700" cap="flat" cmpd="sng" algn="ctr">
+                      <a:solidFill>
+                        <a:schemeClr val="bg2">
+                          <a:lumMod val="40000"/>
+                          <a:lumOff val="60000"/>
+                        </a:schemeClr>
+                      </a:solidFill>
+                      <a:prstDash val="solid"/>
+                      <a:round/>
+                      <a:headEnd type="none" w="med" len="med"/>
+                      <a:tailEnd type="none" w="med" len="med"/>
+                    </a:lnL>
+                    <a:lnR w="12700" cap="flat" cmpd="sng" algn="ctr">
+                      <a:solidFill>
+                        <a:schemeClr val="bg2">
+                          <a:lumMod val="40000"/>
+                          <a:lumOff val="60000"/>
+                        </a:schemeClr>
+                      </a:solidFill>
+                      <a:prstDash val="solid"/>
+                      <a:round/>
+                      <a:headEnd type="none" w="med" len="med"/>
+                      <a:tailEnd type="none" w="med" len="med"/>
+                    </a:lnR>
+                    <a:lnT w="12700" cap="flat" cmpd="sng" algn="ctr">
+                      <a:solidFill>
+                        <a:schemeClr val="bg2">
+                          <a:lumMod val="40000"/>
+                          <a:lumOff val="60000"/>
+                        </a:schemeClr>
+                      </a:solidFill>
+                      <a:prstDash val="solid"/>
+                      <a:round/>
+                      <a:headEnd type="none" w="med" len="med"/>
+                      <a:tailEnd type="none" w="med" len="med"/>
+                    </a:lnT>
+                    <a:lnB w="12700" cap="flat" cmpd="sng" algn="ctr">
+                      <a:solidFill>
+                        <a:schemeClr val="bg2">
+                          <a:lumMod val="40000"/>
+                          <a:lumOff val="60000"/>
+                        </a:schemeClr>
+                      </a:solidFill>
+                      <a:prstDash val="solid"/>
+                      <a:round/>
+                      <a:headEnd type="none" w="med" len="med"/>
+                      <a:tailEnd type="none" w="med" len="med"/>
+                    </a:lnB>
+                    <a:lnTlToBr w="12700" cmpd="sng">
+                      <a:noFill/>
+                      <a:prstDash val="solid"/>
+                    </a:lnTlToBr>
+                    <a:lnBlToTr w="12700" cmpd="sng">
+                      <a:noFill/>
+                      <a:prstDash val="solid"/>
+                    </a:lnBlToTr>
+                    <a:noFill/>
+                  </a:tcPr>
+                </a:tc>
+                <a:tc>
+                  <a:txBody>
+                    <a:bodyPr/>
+                    <a:lstStyle/>
+                    <a:p>
+                      <a:pPr algn="ctr">
+                        <a:buNone/>
+                      </a:pPr>
+                      <a:r>
+                        <a:rPr lang="en-US" sz="1300">
+                          <a:effectLst/>
+                          <a:latin typeface="Fira Sans" panose="020B0503050000020004" pitchFamily="34" charset="0"/>
+                        </a:rPr>
+                        <a:t>1.90</a:t>
+                      </a:r>
+                    </a:p>
+                  </a:txBody>
+                  <a:tcPr anchor="ctr">
+                    <a:lnL w="12700" cap="flat" cmpd="sng" algn="ctr">
+                      <a:solidFill>
+                        <a:schemeClr val="bg2">
+                          <a:lumMod val="40000"/>
+                          <a:lumOff val="60000"/>
+                        </a:schemeClr>
+                      </a:solidFill>
+                      <a:prstDash val="solid"/>
+                      <a:round/>
+                      <a:headEnd type="none" w="med" len="med"/>
+                      <a:tailEnd type="none" w="med" len="med"/>
+                    </a:lnL>
+                    <a:lnR w="12700" cap="flat" cmpd="sng" algn="ctr">
+                      <a:solidFill>
+                        <a:schemeClr val="bg2">
+                          <a:lumMod val="40000"/>
+                          <a:lumOff val="60000"/>
+                        </a:schemeClr>
+                      </a:solidFill>
+                      <a:prstDash val="solid"/>
+                      <a:round/>
+                      <a:headEnd type="none" w="med" len="med"/>
+                      <a:tailEnd type="none" w="med" len="med"/>
+                    </a:lnR>
+                    <a:lnT w="12700" cap="flat" cmpd="sng" algn="ctr">
+                      <a:solidFill>
+                        <a:schemeClr val="bg2">
+                          <a:lumMod val="40000"/>
+                          <a:lumOff val="60000"/>
+                        </a:schemeClr>
+                      </a:solidFill>
+                      <a:prstDash val="solid"/>
+                      <a:round/>
+                      <a:headEnd type="none" w="med" len="med"/>
+                      <a:tailEnd type="none" w="med" len="med"/>
+                    </a:lnT>
+                    <a:lnB w="12700" cap="flat" cmpd="sng" algn="ctr">
+                      <a:solidFill>
+                        <a:schemeClr val="bg2">
+                          <a:lumMod val="40000"/>
+                          <a:lumOff val="60000"/>
+                        </a:schemeClr>
+                      </a:solidFill>
+                      <a:prstDash val="solid"/>
+                      <a:round/>
+                      <a:headEnd type="none" w="med" len="med"/>
+                      <a:tailEnd type="none" w="med" len="med"/>
+                    </a:lnB>
+                    <a:lnTlToBr w="12700" cmpd="sng">
+                      <a:noFill/>
+                      <a:prstDash val="solid"/>
+                    </a:lnTlToBr>
+                    <a:lnBlToTr w="12700" cmpd="sng">
+                      <a:noFill/>
+                      <a:prstDash val="solid"/>
+                    </a:lnBlToTr>
+                    <a:noFill/>
+                  </a:tcPr>
+                </a:tc>
+                <a:tc>
+                  <a:txBody>
+                    <a:bodyPr/>
+                    <a:lstStyle/>
+                    <a:p>
+                      <a:pPr algn="ctr">
+                        <a:buNone/>
+                      </a:pPr>
+                      <a:r>
+                        <a:rPr lang="en-US" sz="1300" dirty="0">
+                          <a:effectLst/>
+                          <a:latin typeface="Fira Sans" panose="020B0503050000020004" pitchFamily="34" charset="0"/>
+                        </a:rPr>
+                        <a:t>3.00</a:t>
+                      </a:r>
+                    </a:p>
+                  </a:txBody>
+                  <a:tcPr anchor="ctr">
+                    <a:lnL w="12700" cap="flat" cmpd="sng" algn="ctr">
+                      <a:solidFill>
+                        <a:schemeClr val="bg2">
+                          <a:lumMod val="40000"/>
+                          <a:lumOff val="60000"/>
+                        </a:schemeClr>
+                      </a:solidFill>
+                      <a:prstDash val="solid"/>
+                      <a:round/>
+                      <a:headEnd type="none" w="med" len="med"/>
+                      <a:tailEnd type="none" w="med" len="med"/>
+                    </a:lnL>
+                    <a:lnR w="12700" cap="flat" cmpd="sng" algn="ctr">
+                      <a:solidFill>
+                        <a:schemeClr val="bg2">
+                          <a:lumMod val="40000"/>
+                          <a:lumOff val="60000"/>
+                        </a:schemeClr>
+                      </a:solidFill>
+                      <a:prstDash val="solid"/>
+                      <a:round/>
+                      <a:headEnd type="none" w="med" len="med"/>
+                      <a:tailEnd type="none" w="med" len="med"/>
+                    </a:lnR>
+                    <a:lnT w="12700" cap="flat" cmpd="sng" algn="ctr">
+                      <a:solidFill>
+                        <a:schemeClr val="bg2">
+                          <a:lumMod val="40000"/>
+                          <a:lumOff val="60000"/>
+                        </a:schemeClr>
+                      </a:solidFill>
+                      <a:prstDash val="solid"/>
+                      <a:round/>
+                      <a:headEnd type="none" w="med" len="med"/>
+                      <a:tailEnd type="none" w="med" len="med"/>
+                    </a:lnT>
+                    <a:lnB w="12700" cap="flat" cmpd="sng" algn="ctr">
+                      <a:solidFill>
+                        <a:schemeClr val="bg2">
+                          <a:lumMod val="40000"/>
+                          <a:lumOff val="60000"/>
+                        </a:schemeClr>
+                      </a:solidFill>
+                      <a:prstDash val="solid"/>
+                      <a:round/>
+                      <a:headEnd type="none" w="med" len="med"/>
+                      <a:tailEnd type="none" w="med" len="med"/>
+                    </a:lnB>
+                    <a:lnTlToBr w="12700" cmpd="sng">
+                      <a:noFill/>
+                      <a:prstDash val="solid"/>
+                    </a:lnTlToBr>
+                    <a:lnBlToTr w="12700" cmpd="sng">
+                      <a:noFill/>
+                      <a:prstDash val="solid"/>
+                    </a:lnBlToTr>
+                    <a:noFill/>
+                  </a:tcPr>
+                </a:tc>
+                <a:tc>
+                  <a:txBody>
+                    <a:bodyPr/>
+                    <a:lstStyle/>
+                    <a:p>
+                      <a:pPr algn="ctr">
+                        <a:buNone/>
+                      </a:pPr>
+                      <a:r>
+                        <a:rPr lang="en-US" sz="1300" dirty="0">
+                          <a:effectLst/>
+                          <a:latin typeface="Fira Sans" panose="020B0503050000020004" pitchFamily="34" charset="0"/>
+                        </a:rPr>
+                        <a:t>HSE Dublin and North East</a:t>
+                      </a:r>
+                    </a:p>
+                  </a:txBody>
+                  <a:tcPr anchor="ctr">
+                    <a:lnL w="12700" cap="flat" cmpd="sng" algn="ctr">
+                      <a:solidFill>
+                        <a:schemeClr val="bg2">
+                          <a:lumMod val="40000"/>
+                          <a:lumOff val="60000"/>
+                        </a:schemeClr>
+                      </a:solidFill>
+                      <a:prstDash val="solid"/>
+                      <a:round/>
+                      <a:headEnd type="none" w="med" len="med"/>
+                      <a:tailEnd type="none" w="med" len="med"/>
+                    </a:lnL>
+                    <a:lnR w="12700" cap="flat" cmpd="sng" algn="ctr">
+                      <a:solidFill>
+                        <a:schemeClr val="bg2">
+                          <a:lumMod val="40000"/>
+                          <a:lumOff val="60000"/>
+                        </a:schemeClr>
+                      </a:solidFill>
+                      <a:prstDash val="solid"/>
+                      <a:round/>
+                      <a:headEnd type="none" w="med" len="med"/>
+                      <a:tailEnd type="none" w="med" len="med"/>
+                    </a:lnR>
+                    <a:lnT w="12700" cap="flat" cmpd="sng" algn="ctr">
+                      <a:solidFill>
+                        <a:schemeClr val="bg2">
+                          <a:lumMod val="40000"/>
+                          <a:lumOff val="60000"/>
+                        </a:schemeClr>
+                      </a:solidFill>
+                      <a:prstDash val="solid"/>
+                      <a:round/>
+                      <a:headEnd type="none" w="med" len="med"/>
+                      <a:tailEnd type="none" w="med" len="med"/>
+                    </a:lnT>
+                    <a:lnB w="12700" cap="flat" cmpd="sng" algn="ctr">
+                      <a:solidFill>
+                        <a:schemeClr val="bg2">
+                          <a:lumMod val="40000"/>
+                          <a:lumOff val="60000"/>
+                        </a:schemeClr>
+                      </a:solidFill>
+                      <a:prstDash val="solid"/>
+                      <a:round/>
+                      <a:headEnd type="none" w="med" len="med"/>
+                      <a:tailEnd type="none" w="med" len="med"/>
+                    </a:lnB>
+                    <a:lnTlToBr w="12700" cmpd="sng">
+                      <a:noFill/>
+                      <a:prstDash val="solid"/>
+                    </a:lnTlToBr>
+                    <a:lnBlToTr w="12700" cmpd="sng">
+                      <a:noFill/>
+                      <a:prstDash val="solid"/>
+                    </a:lnBlToTr>
+                    <a:noFill/>
+                  </a:tcPr>
+                </a:tc>
+                <a:extLst>
+                  <a:ext uri="{0D108BD9-81ED-4DB2-BD59-A6C34878D82A}">
+                    <a16:rowId xmlns:a16="http://schemas.microsoft.com/office/drawing/2014/main" val="3957058543"/>
+                  </a:ext>
+                </a:extLst>
+              </a:tr>
+            </a:tbl>
+          </a:graphicData>
+        </a:graphic>
+      </p:graphicFrame>
     </p:spTree>
     <p:extLst>
       <p:ext uri="{BB962C8B-B14F-4D97-AF65-F5344CB8AC3E}">

</xml_diff>

<commit_message>
small fix to poster
</commit_message>
<xml_diff>
--- a/Poster/Poster_Presentation.pptx
+++ b/Poster/Poster_Presentation.pptx
@@ -8389,8 +8389,8 @@
           </a:p>
         </p:txBody>
       </p:sp>
-      <mc:AlternateContent xmlns:mc="http://schemas.openxmlformats.org/markup-compatibility/2006">
-        <mc:Choice xmlns:a14="http://schemas.microsoft.com/office/drawing/2010/main" Requires="a14">
+      <mc:AlternateContent xmlns:mc="http://schemas.openxmlformats.org/markup-compatibility/2006" xmlns:a14="http://schemas.microsoft.com/office/drawing/2010/main">
+        <mc:Choice Requires="a14">
           <p:sp>
             <p:nvSpPr>
               <p:cNvPr id="63" name="Google Shape;63;p13">
@@ -8428,12 +8428,12 @@
                   </a:buClr>
                   <a:buSzPts val="6000"/>
                 </a:pPr>
-                <a14:m/>
+                <a:endParaRPr/>
               </a:p>
             </p:txBody>
           </p:sp>
         </mc:Choice>
-        <mc:Fallback>
+        <mc:Fallback xmlns="">
           <p:sp>
             <p:nvSpPr>
               <p:cNvPr id="63" name="Google Shape;63;p13">
@@ -8647,7 +8647,7 @@
         </p:nvSpPr>
         <p:spPr>
           <a:xfrm>
-            <a:off x="1151807" y="4241159"/>
+            <a:off x="1141302" y="4484916"/>
             <a:ext cx="6702985" cy="4291559"/>
           </a:xfrm>
           <a:prstGeom prst="rect">
@@ -8667,7 +8667,7 @@
                 <a:ea typeface="Calibri" panose="020F0502020204030204" pitchFamily="34" charset="0"/>
                 <a:cs typeface="Arial" panose="020B0604020202020204" pitchFamily="34" charset="0"/>
               </a:rPr>
-              <a:t>In Irish emergency departments it is common to put patients on trolleys after they have been admitted but are awaiting treatment. Live daily counts of patients on trolleys are frequently used by policymakers and the media to assess levels of hospital overcrowding [1].</a:t>
+              <a:t>In Irish emergency departments it is standard to put patients on trolleys after having been admitted and before being seen. Live daily counts of patients on trolleys are frequently used by policymakers and the media to assess levels of hospital overcrowding [1].</a:t>
             </a:r>
           </a:p>
           <a:p>
@@ -8780,7 +8780,7 @@
             <p:spPr>
               <a:xfrm>
                 <a:off x="1124062" y="11135666"/>
-                <a:ext cx="6867963" cy="9135450"/>
+                <a:ext cx="6867963" cy="8855501"/>
               </a:xfrm>
               <a:prstGeom prst="rect">
                 <a:avLst/>
@@ -9727,6 +9727,15 @@
                       </m:r>
                     </m:oMath>
                   </m:oMathPara>
+                </a14:m>
+                <a:endParaRPr lang="en-US" sz="1559" dirty="0">
+                  <a:latin typeface="Cambria Math" panose="02040503050406030204" pitchFamily="18" charset="0"/>
+                  <a:cs typeface="Arial" panose="020B0604020202020204" pitchFamily="34" charset="0"/>
+                </a:endParaRPr>
+              </a:p>
+              <a:p>
+                <a:pPr algn="ctr"/>
+                <a14:m>
                   <m:oMathPara xmlns:m="http://schemas.openxmlformats.org/officeDocument/2006/math">
                     <m:oMathParaPr>
                       <m:jc m:val="centerGroup"/>
@@ -9735,7 +9744,7 @@
                       <m:sSub>
                         <m:sSubPr>
                           <m:ctrlPr>
-                            <a:rPr lang="en-US" sz="1559" i="1" smtClean="0">
+                            <a:rPr lang="en-US" sz="1559" i="1">
                               <a:latin typeface="Cambria Math" panose="02040503050406030204" pitchFamily="18" charset="0"/>
                               <a:cs typeface="Arial" panose="020B0604020202020204" pitchFamily="34" charset="0"/>
                             </a:rPr>
@@ -9743,7 +9752,7 @@
                         </m:sSubPr>
                         <m:e>
                           <m:r>
-                            <a:rPr lang="en-US" sz="1559" i="1" smtClean="0">
+                            <a:rPr lang="en-US" sz="1559" i="1">
                               <a:latin typeface="Cambria Math" panose="02040503050406030204" pitchFamily="18" charset="0"/>
                               <a:cs typeface="Arial" panose="020B0604020202020204" pitchFamily="34" charset="0"/>
                             </a:rPr>
@@ -10052,11 +10061,8 @@
                     </m:oMath>
                   </m:oMathPara>
                 </a14:m>
-              </a:p>
-              <a:p>
-                <a:pPr/>
                 <a:endParaRPr lang="en-US" sz="1559" dirty="0">
-                  <a:latin typeface="Arial" panose="020B0604020202020204" pitchFamily="34" charset="0"/>
+                  <a:latin typeface="Cambria Math" panose="02040503050406030204" pitchFamily="18" charset="0"/>
                   <a:cs typeface="Arial" panose="020B0604020202020204" pitchFamily="34" charset="0"/>
                 </a:endParaRPr>
               </a:p>
@@ -10392,7 +10398,6 @@
                 </a:endParaRPr>
               </a:p>
               <a:p>
-                <a:pPr/>
                 <a:endParaRPr lang="en-US" sz="1299" dirty="0">
                   <a:latin typeface="Arial" panose="020B0604020202020204" pitchFamily="34" charset="0"/>
                   <a:cs typeface="Arial" panose="020B0604020202020204" pitchFamily="34" charset="0"/>
@@ -10525,7 +10530,7 @@
             <p:spPr>
               <a:xfrm>
                 <a:off x="1124062" y="11135666"/>
-                <a:ext cx="6867963" cy="9135450"/>
+                <a:ext cx="6867963" cy="8855501"/>
               </a:xfrm>
               <a:prstGeom prst="rect">
                 <a:avLst/>
@@ -10533,7 +10538,7 @@
               <a:blipFill>
                 <a:blip r:embed="rId5"/>
                 <a:stretch>
-                  <a:fillRect l="-738" t="-278" r="-738"/>
+                  <a:fillRect l="-738" t="-287" r="-738"/>
                 </a:stretch>
               </a:blipFill>
             </p:spPr>
@@ -13663,8 +13668,8 @@
           </a:graphicData>
         </a:graphic>
       </p:graphicFrame>
-      <mc:AlternateContent xmlns:mc="http://schemas.openxmlformats.org/markup-compatibility/2006">
-        <mc:Choice xmlns:a14="http://schemas.microsoft.com/office/drawing/2010/main" Requires="a14">
+      <mc:AlternateContent xmlns:mc="http://schemas.openxmlformats.org/markup-compatibility/2006" xmlns:a14="http://schemas.microsoft.com/office/drawing/2010/main">
+        <mc:Choice Requires="a14">
           <p:sp>
             <p:nvSpPr>
               <p:cNvPr id="33" name="TextBox 32">
@@ -13749,7 +13754,7 @@
             </p:txBody>
           </p:sp>
         </mc:Choice>
-        <mc:Fallback>
+        <mc:Fallback xmlns="">
           <p:sp>
             <p:nvSpPr>
               <p:cNvPr id="33" name="TextBox 32">
@@ -14288,8 +14293,8 @@
           </p:sp>
         </mc:Fallback>
       </mc:AlternateContent>
-      <mc:AlternateContent xmlns:mc="http://schemas.openxmlformats.org/markup-compatibility/2006">
-        <mc:Choice xmlns:a14="http://schemas.microsoft.com/office/drawing/2010/main" Requires="a14">
+      <mc:AlternateContent xmlns:mc="http://schemas.openxmlformats.org/markup-compatibility/2006" xmlns:a14="http://schemas.microsoft.com/office/drawing/2010/main">
+        <mc:Choice Requires="a14">
           <p:sp>
             <p:nvSpPr>
               <p:cNvPr id="19" name="TextBox 18">
@@ -14390,7 +14395,7 @@
             </p:txBody>
           </p:sp>
         </mc:Choice>
-        <mc:Fallback>
+        <mc:Fallback xmlns="">
           <p:sp>
             <p:nvSpPr>
               <p:cNvPr id="19" name="TextBox 18">
@@ -14435,8 +14440,8 @@
           </p:sp>
         </mc:Fallback>
       </mc:AlternateContent>
-      <mc:AlternateContent xmlns:mc="http://schemas.openxmlformats.org/markup-compatibility/2006">
-        <mc:Choice xmlns:a14="http://schemas.microsoft.com/office/drawing/2010/main" Requires="a14">
+      <mc:AlternateContent xmlns:mc="http://schemas.openxmlformats.org/markup-compatibility/2006" xmlns:a14="http://schemas.microsoft.com/office/drawing/2010/main">
+        <mc:Choice Requires="a14">
           <p:sp>
             <p:nvSpPr>
               <p:cNvPr id="22" name="TextBox 21">
@@ -14486,7 +14491,7 @@
             </p:txBody>
           </p:sp>
         </mc:Choice>
-        <mc:Fallback>
+        <mc:Fallback xmlns="">
           <p:sp>
             <p:nvSpPr>
               <p:cNvPr id="22" name="TextBox 21">

</xml_diff>